<commit_message>
update five parameter definition picture
</commit_message>
<xml_diff>
--- a/figures.pptx
+++ b/figures.pptx
@@ -107,6 +107,11 @@
       </a:defRPr>
     </a:lvl9pPr>
   </p:defaultTextStyle>
+  <p:extLst>
+    <p:ext uri="{EFAFB233-063F-42B5-8137-9DF3F51BA10A}">
+      <p15:sldGuideLst xmlns:p15="http://schemas.microsoft.com/office/powerpoint/2012/main"/>
+    </p:ext>
+  </p:extLst>
 </p:presentation>
 </file>
 
@@ -172,6 +177,11 @@
               </a:ln>
               <a:effectLst/>
             </c:spPr>
+            <c:extLst>
+              <c:ext xmlns:c16="http://schemas.microsoft.com/office/drawing/2014/chart" uri="{C3380CC4-5D6E-409C-BE32-E72D297353CC}">
+                <c16:uniqueId val="{00000001-A039-4625-8CC2-FF7191EB9979}"/>
+              </c:ext>
+            </c:extLst>
           </c:dPt>
           <c:dPt>
             <c:idx val="1"/>
@@ -187,6 +197,11 @@
               </a:ln>
               <a:effectLst/>
             </c:spPr>
+            <c:extLst>
+              <c:ext xmlns:c16="http://schemas.microsoft.com/office/drawing/2014/chart" uri="{C3380CC4-5D6E-409C-BE32-E72D297353CC}">
+                <c16:uniqueId val="{00000003-A039-4625-8CC2-FF7191EB9979}"/>
+              </c:ext>
+            </c:extLst>
           </c:dPt>
           <c:dPt>
             <c:idx val="2"/>
@@ -202,6 +217,11 @@
               </a:ln>
               <a:effectLst/>
             </c:spPr>
+            <c:extLst>
+              <c:ext xmlns:c16="http://schemas.microsoft.com/office/drawing/2014/chart" uri="{C3380CC4-5D6E-409C-BE32-E72D297353CC}">
+                <c16:uniqueId val="{00000005-A039-4625-8CC2-FF7191EB9979}"/>
+              </c:ext>
+            </c:extLst>
           </c:dPt>
           <c:dPt>
             <c:idx val="3"/>
@@ -217,6 +237,11 @@
               </a:ln>
               <a:effectLst/>
             </c:spPr>
+            <c:extLst>
+              <c:ext xmlns:c16="http://schemas.microsoft.com/office/drawing/2014/chart" uri="{C3380CC4-5D6E-409C-BE32-E72D297353CC}">
+                <c16:uniqueId val="{00000007-A039-4625-8CC2-FF7191EB9979}"/>
+              </c:ext>
+            </c:extLst>
           </c:dPt>
           <c:dPt>
             <c:idx val="4"/>
@@ -232,6 +257,11 @@
               </a:ln>
               <a:effectLst/>
             </c:spPr>
+            <c:extLst>
+              <c:ext xmlns:c16="http://schemas.microsoft.com/office/drawing/2014/chart" uri="{C3380CC4-5D6E-409C-BE32-E72D297353CC}">
+                <c16:uniqueId val="{00000009-A039-4625-8CC2-FF7191EB9979}"/>
+              </c:ext>
+            </c:extLst>
           </c:dPt>
           <c:dPt>
             <c:idx val="5"/>
@@ -247,6 +277,11 @@
               </a:ln>
               <a:effectLst/>
             </c:spPr>
+            <c:extLst>
+              <c:ext xmlns:c16="http://schemas.microsoft.com/office/drawing/2014/chart" uri="{C3380CC4-5D6E-409C-BE32-E72D297353CC}">
+                <c16:uniqueId val="{0000000B-A039-4625-8CC2-FF7191EB9979}"/>
+              </c:ext>
+            </c:extLst>
           </c:dPt>
           <c:dPt>
             <c:idx val="6"/>
@@ -262,6 +297,11 @@
               </a:ln>
               <a:effectLst/>
             </c:spPr>
+            <c:extLst>
+              <c:ext xmlns:c16="http://schemas.microsoft.com/office/drawing/2014/chart" uri="{C3380CC4-5D6E-409C-BE32-E72D297353CC}">
+                <c16:uniqueId val="{0000000D-A039-4625-8CC2-FF7191EB9979}"/>
+              </c:ext>
+            </c:extLst>
           </c:dPt>
           <c:dPt>
             <c:idx val="7"/>
@@ -277,6 +317,11 @@
               </a:ln>
               <a:effectLst/>
             </c:spPr>
+            <c:extLst>
+              <c:ext xmlns:c16="http://schemas.microsoft.com/office/drawing/2014/chart" uri="{C3380CC4-5D6E-409C-BE32-E72D297353CC}">
+                <c16:uniqueId val="{0000000F-A039-4625-8CC2-FF7191EB9979}"/>
+              </c:ext>
+            </c:extLst>
           </c:dPt>
           <c:dPt>
             <c:idx val="8"/>
@@ -292,6 +337,11 @@
               </a:ln>
               <a:effectLst/>
             </c:spPr>
+            <c:extLst>
+              <c:ext xmlns:c16="http://schemas.microsoft.com/office/drawing/2014/chart" uri="{C3380CC4-5D6E-409C-BE32-E72D297353CC}">
+                <c16:uniqueId val="{00000011-A039-4625-8CC2-FF7191EB9979}"/>
+              </c:ext>
+            </c:extLst>
           </c:dPt>
           <c:dPt>
             <c:idx val="9"/>
@@ -307,6 +357,11 @@
               </a:ln>
               <a:effectLst/>
             </c:spPr>
+            <c:extLst>
+              <c:ext xmlns:c16="http://schemas.microsoft.com/office/drawing/2014/chart" uri="{C3380CC4-5D6E-409C-BE32-E72D297353CC}">
+                <c16:uniqueId val="{00000013-A039-4625-8CC2-FF7191EB9979}"/>
+              </c:ext>
+            </c:extLst>
           </c:dPt>
           <c:dPt>
             <c:idx val="10"/>
@@ -322,6 +377,11 @@
               </a:ln>
               <a:effectLst/>
             </c:spPr>
+            <c:extLst>
+              <c:ext xmlns:c16="http://schemas.microsoft.com/office/drawing/2014/chart" uri="{C3380CC4-5D6E-409C-BE32-E72D297353CC}">
+                <c16:uniqueId val="{00000015-A039-4625-8CC2-FF7191EB9979}"/>
+              </c:ext>
+            </c:extLst>
           </c:dPt>
           <c:dPt>
             <c:idx val="11"/>
@@ -337,6 +397,11 @@
               </a:ln>
               <a:effectLst/>
             </c:spPr>
+            <c:extLst>
+              <c:ext xmlns:c16="http://schemas.microsoft.com/office/drawing/2014/chart" uri="{C3380CC4-5D6E-409C-BE32-E72D297353CC}">
+                <c16:uniqueId val="{00000017-A039-4625-8CC2-FF7191EB9979}"/>
+              </c:ext>
+            </c:extLst>
           </c:dPt>
           <c:dPt>
             <c:idx val="12"/>
@@ -352,6 +417,11 @@
               </a:ln>
               <a:effectLst/>
             </c:spPr>
+            <c:extLst>
+              <c:ext xmlns:c16="http://schemas.microsoft.com/office/drawing/2014/chart" uri="{C3380CC4-5D6E-409C-BE32-E72D297353CC}">
+                <c16:uniqueId val="{00000019-A039-4625-8CC2-FF7191EB9979}"/>
+              </c:ext>
+            </c:extLst>
           </c:dPt>
           <c:dPt>
             <c:idx val="13"/>
@@ -367,6 +437,11 @@
               </a:ln>
               <a:effectLst/>
             </c:spPr>
+            <c:extLst>
+              <c:ext xmlns:c16="http://schemas.microsoft.com/office/drawing/2014/chart" uri="{C3380CC4-5D6E-409C-BE32-E72D297353CC}">
+                <c16:uniqueId val="{0000001B-A039-4625-8CC2-FF7191EB9979}"/>
+              </c:ext>
+            </c:extLst>
           </c:dPt>
           <c:dPt>
             <c:idx val="14"/>
@@ -382,6 +457,11 @@
               </a:ln>
               <a:effectLst/>
             </c:spPr>
+            <c:extLst>
+              <c:ext xmlns:c16="http://schemas.microsoft.com/office/drawing/2014/chart" uri="{C3380CC4-5D6E-409C-BE32-E72D297353CC}">
+                <c16:uniqueId val="{0000001D-A039-4625-8CC2-FF7191EB9979}"/>
+              </c:ext>
+            </c:extLst>
           </c:dPt>
           <c:dPt>
             <c:idx val="15"/>
@@ -397,6 +477,11 @@
               </a:ln>
               <a:effectLst/>
             </c:spPr>
+            <c:extLst>
+              <c:ext xmlns:c16="http://schemas.microsoft.com/office/drawing/2014/chart" uri="{C3380CC4-5D6E-409C-BE32-E72D297353CC}">
+                <c16:uniqueId val="{0000001F-A039-4625-8CC2-FF7191EB9979}"/>
+              </c:ext>
+            </c:extLst>
           </c:dPt>
           <c:dPt>
             <c:idx val="16"/>
@@ -412,6 +497,11 @@
               </a:ln>
               <a:effectLst/>
             </c:spPr>
+            <c:extLst>
+              <c:ext xmlns:c16="http://schemas.microsoft.com/office/drawing/2014/chart" uri="{C3380CC4-5D6E-409C-BE32-E72D297353CC}">
+                <c16:uniqueId val="{00000021-A039-4625-8CC2-FF7191EB9979}"/>
+              </c:ext>
+            </c:extLst>
           </c:dPt>
           <c:dPt>
             <c:idx val="17"/>
@@ -427,6 +517,11 @@
               </a:ln>
               <a:effectLst/>
             </c:spPr>
+            <c:extLst>
+              <c:ext xmlns:c16="http://schemas.microsoft.com/office/drawing/2014/chart" uri="{C3380CC4-5D6E-409C-BE32-E72D297353CC}">
+                <c16:uniqueId val="{00000023-A039-4625-8CC2-FF7191EB9979}"/>
+              </c:ext>
+            </c:extLst>
           </c:dPt>
           <c:dPt>
             <c:idx val="18"/>
@@ -442,6 +537,11 @@
               </a:ln>
               <a:effectLst/>
             </c:spPr>
+            <c:extLst>
+              <c:ext xmlns:c16="http://schemas.microsoft.com/office/drawing/2014/chart" uri="{C3380CC4-5D6E-409C-BE32-E72D297353CC}">
+                <c16:uniqueId val="{00000025-A039-4625-8CC2-FF7191EB9979}"/>
+              </c:ext>
+            </c:extLst>
           </c:dPt>
           <c:dPt>
             <c:idx val="19"/>
@@ -457,6 +557,11 @@
               </a:ln>
               <a:effectLst/>
             </c:spPr>
+            <c:extLst>
+              <c:ext xmlns:c16="http://schemas.microsoft.com/office/drawing/2014/chart" uri="{C3380CC4-5D6E-409C-BE32-E72D297353CC}">
+                <c16:uniqueId val="{00000027-A039-4625-8CC2-FF7191EB9979}"/>
+              </c:ext>
+            </c:extLst>
           </c:dPt>
           <c:dPt>
             <c:idx val="20"/>
@@ -472,6 +577,11 @@
               </a:ln>
               <a:effectLst/>
             </c:spPr>
+            <c:extLst>
+              <c:ext xmlns:c16="http://schemas.microsoft.com/office/drawing/2014/chart" uri="{C3380CC4-5D6E-409C-BE32-E72D297353CC}">
+                <c16:uniqueId val="{00000029-A039-4625-8CC2-FF7191EB9979}"/>
+              </c:ext>
+            </c:extLst>
           </c:dPt>
           <c:dPt>
             <c:idx val="21"/>
@@ -507,6 +617,11 @@
               </a:ln>
               <a:effectLst/>
             </c:spPr>
+            <c:extLst>
+              <c:ext xmlns:c16="http://schemas.microsoft.com/office/drawing/2014/chart" uri="{C3380CC4-5D6E-409C-BE32-E72D297353CC}">
+                <c16:uniqueId val="{0000002D-A039-4625-8CC2-FF7191EB9979}"/>
+              </c:ext>
+            </c:extLst>
           </c:dPt>
           <c:dPt>
             <c:idx val="23"/>
@@ -522,6 +637,11 @@
               </a:ln>
               <a:effectLst/>
             </c:spPr>
+            <c:extLst>
+              <c:ext xmlns:c16="http://schemas.microsoft.com/office/drawing/2014/chart" uri="{C3380CC4-5D6E-409C-BE32-E72D297353CC}">
+                <c16:uniqueId val="{0000002F-A039-4625-8CC2-FF7191EB9979}"/>
+              </c:ext>
+            </c:extLst>
           </c:dPt>
           <c:dPt>
             <c:idx val="24"/>
@@ -537,6 +657,11 @@
               </a:ln>
               <a:effectLst/>
             </c:spPr>
+            <c:extLst>
+              <c:ext xmlns:c16="http://schemas.microsoft.com/office/drawing/2014/chart" uri="{C3380CC4-5D6E-409C-BE32-E72D297353CC}">
+                <c16:uniqueId val="{00000031-A039-4625-8CC2-FF7191EB9979}"/>
+              </c:ext>
+            </c:extLst>
           </c:dPt>
           <c:dPt>
             <c:idx val="25"/>
@@ -552,6 +677,11 @@
               </a:ln>
               <a:effectLst/>
             </c:spPr>
+            <c:extLst>
+              <c:ext xmlns:c16="http://schemas.microsoft.com/office/drawing/2014/chart" uri="{C3380CC4-5D6E-409C-BE32-E72D297353CC}">
+                <c16:uniqueId val="{00000033-A039-4625-8CC2-FF7191EB9979}"/>
+              </c:ext>
+            </c:extLst>
           </c:dPt>
           <c:dPt>
             <c:idx val="26"/>
@@ -567,6 +697,11 @@
               </a:ln>
               <a:effectLst/>
             </c:spPr>
+            <c:extLst>
+              <c:ext xmlns:c16="http://schemas.microsoft.com/office/drawing/2014/chart" uri="{C3380CC4-5D6E-409C-BE32-E72D297353CC}">
+                <c16:uniqueId val="{00000035-A039-4625-8CC2-FF7191EB9979}"/>
+              </c:ext>
+            </c:extLst>
           </c:dPt>
           <c:dPt>
             <c:idx val="27"/>
@@ -582,6 +717,11 @@
               </a:ln>
               <a:effectLst/>
             </c:spPr>
+            <c:extLst>
+              <c:ext xmlns:c16="http://schemas.microsoft.com/office/drawing/2014/chart" uri="{C3380CC4-5D6E-409C-BE32-E72D297353CC}">
+                <c16:uniqueId val="{00000037-A039-4625-8CC2-FF7191EB9979}"/>
+              </c:ext>
+            </c:extLst>
           </c:dPt>
           <c:dPt>
             <c:idx val="28"/>
@@ -597,6 +737,11 @@
               </a:ln>
               <a:effectLst/>
             </c:spPr>
+            <c:extLst>
+              <c:ext xmlns:c16="http://schemas.microsoft.com/office/drawing/2014/chart" uri="{C3380CC4-5D6E-409C-BE32-E72D297353CC}">
+                <c16:uniqueId val="{00000039-A039-4625-8CC2-FF7191EB9979}"/>
+              </c:ext>
+            </c:extLst>
           </c:dPt>
           <c:dPt>
             <c:idx val="29"/>
@@ -612,6 +757,11 @@
               </a:ln>
               <a:effectLst/>
             </c:spPr>
+            <c:extLst>
+              <c:ext xmlns:c16="http://schemas.microsoft.com/office/drawing/2014/chart" uri="{C3380CC4-5D6E-409C-BE32-E72D297353CC}">
+                <c16:uniqueId val="{0000003B-A039-4625-8CC2-FF7191EB9979}"/>
+              </c:ext>
+            </c:extLst>
           </c:dPt>
           <c:dPt>
             <c:idx val="30"/>
@@ -627,6 +777,11 @@
               </a:ln>
               <a:effectLst/>
             </c:spPr>
+            <c:extLst>
+              <c:ext xmlns:c16="http://schemas.microsoft.com/office/drawing/2014/chart" uri="{C3380CC4-5D6E-409C-BE32-E72D297353CC}">
+                <c16:uniqueId val="{0000003D-A039-4625-8CC2-FF7191EB9979}"/>
+              </c:ext>
+            </c:extLst>
           </c:dPt>
           <c:dPt>
             <c:idx val="31"/>
@@ -642,6 +797,11 @@
               </a:ln>
               <a:effectLst/>
             </c:spPr>
+            <c:extLst>
+              <c:ext xmlns:c16="http://schemas.microsoft.com/office/drawing/2014/chart" uri="{C3380CC4-5D6E-409C-BE32-E72D297353CC}">
+                <c16:uniqueId val="{0000003F-A039-4625-8CC2-FF7191EB9979}"/>
+              </c:ext>
+            </c:extLst>
           </c:dPt>
           <c:dPt>
             <c:idx val="32"/>
@@ -657,6 +817,11 @@
               </a:ln>
               <a:effectLst/>
             </c:spPr>
+            <c:extLst>
+              <c:ext xmlns:c16="http://schemas.microsoft.com/office/drawing/2014/chart" uri="{C3380CC4-5D6E-409C-BE32-E72D297353CC}">
+                <c16:uniqueId val="{00000041-A039-4625-8CC2-FF7191EB9979}"/>
+              </c:ext>
+            </c:extLst>
           </c:dPt>
           <c:dPt>
             <c:idx val="33"/>
@@ -672,6 +837,11 @@
               </a:ln>
               <a:effectLst/>
             </c:spPr>
+            <c:extLst>
+              <c:ext xmlns:c16="http://schemas.microsoft.com/office/drawing/2014/chart" uri="{C3380CC4-5D6E-409C-BE32-E72D297353CC}">
+                <c16:uniqueId val="{00000043-A039-4625-8CC2-FF7191EB9979}"/>
+              </c:ext>
+            </c:extLst>
           </c:dPt>
           <c:dPt>
             <c:idx val="34"/>
@@ -687,6 +857,11 @@
               </a:ln>
               <a:effectLst/>
             </c:spPr>
+            <c:extLst>
+              <c:ext xmlns:c16="http://schemas.microsoft.com/office/drawing/2014/chart" uri="{C3380CC4-5D6E-409C-BE32-E72D297353CC}">
+                <c16:uniqueId val="{00000045-A039-4625-8CC2-FF7191EB9979}"/>
+              </c:ext>
+            </c:extLst>
           </c:dPt>
           <c:dPt>
             <c:idx val="35"/>
@@ -702,6 +877,11 @@
               </a:ln>
               <a:effectLst/>
             </c:spPr>
+            <c:extLst>
+              <c:ext xmlns:c16="http://schemas.microsoft.com/office/drawing/2014/chart" uri="{C3380CC4-5D6E-409C-BE32-E72D297353CC}">
+                <c16:uniqueId val="{00000047-A039-4625-8CC2-FF7191EB9979}"/>
+              </c:ext>
+            </c:extLst>
           </c:dPt>
           <c:dPt>
             <c:idx val="36"/>
@@ -717,6 +897,11 @@
               </a:ln>
               <a:effectLst/>
             </c:spPr>
+            <c:extLst>
+              <c:ext xmlns:c16="http://schemas.microsoft.com/office/drawing/2014/chart" uri="{C3380CC4-5D6E-409C-BE32-E72D297353CC}">
+                <c16:uniqueId val="{00000049-A039-4625-8CC2-FF7191EB9979}"/>
+              </c:ext>
+            </c:extLst>
           </c:dPt>
           <c:dPt>
             <c:idx val="37"/>
@@ -732,6 +917,11 @@
               </a:ln>
               <a:effectLst/>
             </c:spPr>
+            <c:extLst>
+              <c:ext xmlns:c16="http://schemas.microsoft.com/office/drawing/2014/chart" uri="{C3380CC4-5D6E-409C-BE32-E72D297353CC}">
+                <c16:uniqueId val="{0000004B-A039-4625-8CC2-FF7191EB9979}"/>
+              </c:ext>
+            </c:extLst>
           </c:dPt>
           <c:dPt>
             <c:idx val="38"/>
@@ -747,6 +937,11 @@
               </a:ln>
               <a:effectLst/>
             </c:spPr>
+            <c:extLst>
+              <c:ext xmlns:c16="http://schemas.microsoft.com/office/drawing/2014/chart" uri="{C3380CC4-5D6E-409C-BE32-E72D297353CC}">
+                <c16:uniqueId val="{0000004D-A039-4625-8CC2-FF7191EB9979}"/>
+              </c:ext>
+            </c:extLst>
           </c:dPt>
           <c:dPt>
             <c:idx val="39"/>
@@ -762,6 +957,11 @@
               </a:ln>
               <a:effectLst/>
             </c:spPr>
+            <c:extLst>
+              <c:ext xmlns:c16="http://schemas.microsoft.com/office/drawing/2014/chart" uri="{C3380CC4-5D6E-409C-BE32-E72D297353CC}">
+                <c16:uniqueId val="{0000004F-A039-4625-8CC2-FF7191EB9979}"/>
+              </c:ext>
+            </c:extLst>
           </c:dPt>
           <c:dPt>
             <c:idx val="40"/>
@@ -777,6 +977,11 @@
               </a:ln>
               <a:effectLst/>
             </c:spPr>
+            <c:extLst>
+              <c:ext xmlns:c16="http://schemas.microsoft.com/office/drawing/2014/chart" uri="{C3380CC4-5D6E-409C-BE32-E72D297353CC}">
+                <c16:uniqueId val="{00000051-A039-4625-8CC2-FF7191EB9979}"/>
+              </c:ext>
+            </c:extLst>
           </c:dPt>
           <c:dPt>
             <c:idx val="41"/>
@@ -792,6 +997,11 @@
               </a:ln>
               <a:effectLst/>
             </c:spPr>
+            <c:extLst>
+              <c:ext xmlns:c16="http://schemas.microsoft.com/office/drawing/2014/chart" uri="{C3380CC4-5D6E-409C-BE32-E72D297353CC}">
+                <c16:uniqueId val="{00000053-A039-4625-8CC2-FF7191EB9979}"/>
+              </c:ext>
+            </c:extLst>
           </c:dPt>
           <c:dPt>
             <c:idx val="42"/>
@@ -827,6 +1037,11 @@
               </a:ln>
               <a:effectLst/>
             </c:spPr>
+            <c:extLst>
+              <c:ext xmlns:c16="http://schemas.microsoft.com/office/drawing/2014/chart" uri="{C3380CC4-5D6E-409C-BE32-E72D297353CC}">
+                <c16:uniqueId val="{00000057-A039-4625-8CC2-FF7191EB9979}"/>
+              </c:ext>
+            </c:extLst>
           </c:dPt>
           <c:dPt>
             <c:idx val="44"/>
@@ -842,6 +1057,11 @@
               </a:ln>
               <a:effectLst/>
             </c:spPr>
+            <c:extLst>
+              <c:ext xmlns:c16="http://schemas.microsoft.com/office/drawing/2014/chart" uri="{C3380CC4-5D6E-409C-BE32-E72D297353CC}">
+                <c16:uniqueId val="{00000059-A039-4625-8CC2-FF7191EB9979}"/>
+              </c:ext>
+            </c:extLst>
           </c:dPt>
           <c:dPt>
             <c:idx val="45"/>
@@ -857,6 +1077,11 @@
               </a:ln>
               <a:effectLst/>
             </c:spPr>
+            <c:extLst>
+              <c:ext xmlns:c16="http://schemas.microsoft.com/office/drawing/2014/chart" uri="{C3380CC4-5D6E-409C-BE32-E72D297353CC}">
+                <c16:uniqueId val="{0000005B-A039-4625-8CC2-FF7191EB9979}"/>
+              </c:ext>
+            </c:extLst>
           </c:dPt>
           <c:dPt>
             <c:idx val="46"/>
@@ -872,6 +1097,11 @@
               </a:ln>
               <a:effectLst/>
             </c:spPr>
+            <c:extLst>
+              <c:ext xmlns:c16="http://schemas.microsoft.com/office/drawing/2014/chart" uri="{C3380CC4-5D6E-409C-BE32-E72D297353CC}">
+                <c16:uniqueId val="{0000005D-A039-4625-8CC2-FF7191EB9979}"/>
+              </c:ext>
+            </c:extLst>
           </c:dPt>
           <c:dPt>
             <c:idx val="47"/>
@@ -887,6 +1117,11 @@
               </a:ln>
               <a:effectLst/>
             </c:spPr>
+            <c:extLst>
+              <c:ext xmlns:c16="http://schemas.microsoft.com/office/drawing/2014/chart" uri="{C3380CC4-5D6E-409C-BE32-E72D297353CC}">
+                <c16:uniqueId val="{0000005F-A039-4625-8CC2-FF7191EB9979}"/>
+              </c:ext>
+            </c:extLst>
           </c:dPt>
           <c:dPt>
             <c:idx val="48"/>
@@ -902,6 +1137,11 @@
               </a:ln>
               <a:effectLst/>
             </c:spPr>
+            <c:extLst>
+              <c:ext xmlns:c16="http://schemas.microsoft.com/office/drawing/2014/chart" uri="{C3380CC4-5D6E-409C-BE32-E72D297353CC}">
+                <c16:uniqueId val="{00000061-A039-4625-8CC2-FF7191EB9979}"/>
+              </c:ext>
+            </c:extLst>
           </c:dPt>
           <c:dPt>
             <c:idx val="49"/>
@@ -917,6 +1157,11 @@
               </a:ln>
               <a:effectLst/>
             </c:spPr>
+            <c:extLst>
+              <c:ext xmlns:c16="http://schemas.microsoft.com/office/drawing/2014/chart" uri="{C3380CC4-5D6E-409C-BE32-E72D297353CC}">
+                <c16:uniqueId val="{00000063-A039-4625-8CC2-FF7191EB9979}"/>
+              </c:ext>
+            </c:extLst>
           </c:dPt>
           <c:dPt>
             <c:idx val="50"/>
@@ -932,6 +1177,11 @@
               </a:ln>
               <a:effectLst/>
             </c:spPr>
+            <c:extLst>
+              <c:ext xmlns:c16="http://schemas.microsoft.com/office/drawing/2014/chart" uri="{C3380CC4-5D6E-409C-BE32-E72D297353CC}">
+                <c16:uniqueId val="{00000065-A039-4625-8CC2-FF7191EB9979}"/>
+              </c:ext>
+            </c:extLst>
           </c:dPt>
           <c:dPt>
             <c:idx val="51"/>
@@ -947,6 +1197,11 @@
               </a:ln>
               <a:effectLst/>
             </c:spPr>
+            <c:extLst>
+              <c:ext xmlns:c16="http://schemas.microsoft.com/office/drawing/2014/chart" uri="{C3380CC4-5D6E-409C-BE32-E72D297353CC}">
+                <c16:uniqueId val="{00000067-A039-4625-8CC2-FF7191EB9979}"/>
+              </c:ext>
+            </c:extLst>
           </c:dPt>
           <c:dPt>
             <c:idx val="52"/>
@@ -962,6 +1217,11 @@
               </a:ln>
               <a:effectLst/>
             </c:spPr>
+            <c:extLst>
+              <c:ext xmlns:c16="http://schemas.microsoft.com/office/drawing/2014/chart" uri="{C3380CC4-5D6E-409C-BE32-E72D297353CC}">
+                <c16:uniqueId val="{00000069-A039-4625-8CC2-FF7191EB9979}"/>
+              </c:ext>
+            </c:extLst>
           </c:dPt>
           <c:dPt>
             <c:idx val="53"/>
@@ -977,6 +1237,11 @@
               </a:ln>
               <a:effectLst/>
             </c:spPr>
+            <c:extLst>
+              <c:ext xmlns:c16="http://schemas.microsoft.com/office/drawing/2014/chart" uri="{C3380CC4-5D6E-409C-BE32-E72D297353CC}">
+                <c16:uniqueId val="{0000006B-A039-4625-8CC2-FF7191EB9979}"/>
+              </c:ext>
+            </c:extLst>
           </c:dPt>
           <c:dPt>
             <c:idx val="54"/>
@@ -992,6 +1257,11 @@
               </a:ln>
               <a:effectLst/>
             </c:spPr>
+            <c:extLst>
+              <c:ext xmlns:c16="http://schemas.microsoft.com/office/drawing/2014/chart" uri="{C3380CC4-5D6E-409C-BE32-E72D297353CC}">
+                <c16:uniqueId val="{0000006D-A039-4625-8CC2-FF7191EB9979}"/>
+              </c:ext>
+            </c:extLst>
           </c:dPt>
           <c:dPt>
             <c:idx val="55"/>
@@ -1007,6 +1277,11 @@
               </a:ln>
               <a:effectLst/>
             </c:spPr>
+            <c:extLst>
+              <c:ext xmlns:c16="http://schemas.microsoft.com/office/drawing/2014/chart" uri="{C3380CC4-5D6E-409C-BE32-E72D297353CC}">
+                <c16:uniqueId val="{0000006F-A039-4625-8CC2-FF7191EB9979}"/>
+              </c:ext>
+            </c:extLst>
           </c:dPt>
           <c:dPt>
             <c:idx val="56"/>
@@ -1022,6 +1297,11 @@
               </a:ln>
               <a:effectLst/>
             </c:spPr>
+            <c:extLst>
+              <c:ext xmlns:c16="http://schemas.microsoft.com/office/drawing/2014/chart" uri="{C3380CC4-5D6E-409C-BE32-E72D297353CC}">
+                <c16:uniqueId val="{00000071-A039-4625-8CC2-FF7191EB9979}"/>
+              </c:ext>
+            </c:extLst>
           </c:dPt>
           <c:dPt>
             <c:idx val="57"/>
@@ -1037,6 +1317,11 @@
               </a:ln>
               <a:effectLst/>
             </c:spPr>
+            <c:extLst>
+              <c:ext xmlns:c16="http://schemas.microsoft.com/office/drawing/2014/chart" uri="{C3380CC4-5D6E-409C-BE32-E72D297353CC}">
+                <c16:uniqueId val="{00000073-A039-4625-8CC2-FF7191EB9979}"/>
+              </c:ext>
+            </c:extLst>
           </c:dPt>
           <c:dPt>
             <c:idx val="58"/>
@@ -1052,6 +1337,11 @@
               </a:ln>
               <a:effectLst/>
             </c:spPr>
+            <c:extLst>
+              <c:ext xmlns:c16="http://schemas.microsoft.com/office/drawing/2014/chart" uri="{C3380CC4-5D6E-409C-BE32-E72D297353CC}">
+                <c16:uniqueId val="{00000075-A039-4625-8CC2-FF7191EB9979}"/>
+              </c:ext>
+            </c:extLst>
           </c:dPt>
           <c:dPt>
             <c:idx val="59"/>
@@ -1067,6 +1357,11 @@
               </a:ln>
               <a:effectLst/>
             </c:spPr>
+            <c:extLst>
+              <c:ext xmlns:c16="http://schemas.microsoft.com/office/drawing/2014/chart" uri="{C3380CC4-5D6E-409C-BE32-E72D297353CC}">
+                <c16:uniqueId val="{00000077-A039-4625-8CC2-FF7191EB9979}"/>
+              </c:ext>
+            </c:extLst>
           </c:dPt>
           <c:dPt>
             <c:idx val="60"/>
@@ -1082,6 +1377,11 @@
               </a:ln>
               <a:effectLst/>
             </c:spPr>
+            <c:extLst>
+              <c:ext xmlns:c16="http://schemas.microsoft.com/office/drawing/2014/chart" uri="{C3380CC4-5D6E-409C-BE32-E72D297353CC}">
+                <c16:uniqueId val="{00000079-A039-4625-8CC2-FF7191EB9979}"/>
+              </c:ext>
+            </c:extLst>
           </c:dPt>
           <c:dPt>
             <c:idx val="61"/>
@@ -1097,6 +1397,11 @@
               </a:ln>
               <a:effectLst/>
             </c:spPr>
+            <c:extLst>
+              <c:ext xmlns:c16="http://schemas.microsoft.com/office/drawing/2014/chart" uri="{C3380CC4-5D6E-409C-BE32-E72D297353CC}">
+                <c16:uniqueId val="{0000007B-A039-4625-8CC2-FF7191EB9979}"/>
+              </c:ext>
+            </c:extLst>
           </c:dPt>
           <c:dPt>
             <c:idx val="62"/>
@@ -1112,6 +1417,11 @@
               </a:ln>
               <a:effectLst/>
             </c:spPr>
+            <c:extLst>
+              <c:ext xmlns:c16="http://schemas.microsoft.com/office/drawing/2014/chart" uri="{C3380CC4-5D6E-409C-BE32-E72D297353CC}">
+                <c16:uniqueId val="{0000007D-A039-4625-8CC2-FF7191EB9979}"/>
+              </c:ext>
+            </c:extLst>
           </c:dPt>
           <c:dPt>
             <c:idx val="63"/>
@@ -1127,6 +1437,11 @@
               </a:ln>
               <a:effectLst/>
             </c:spPr>
+            <c:extLst>
+              <c:ext xmlns:c16="http://schemas.microsoft.com/office/drawing/2014/chart" uri="{C3380CC4-5D6E-409C-BE32-E72D297353CC}">
+                <c16:uniqueId val="{0000007F-A039-4625-8CC2-FF7191EB9979}"/>
+              </c:ext>
+            </c:extLst>
           </c:dPt>
           <c:dPt>
             <c:idx val="64"/>
@@ -1142,6 +1457,11 @@
               </a:ln>
               <a:effectLst/>
             </c:spPr>
+            <c:extLst>
+              <c:ext xmlns:c16="http://schemas.microsoft.com/office/drawing/2014/chart" uri="{C3380CC4-5D6E-409C-BE32-E72D297353CC}">
+                <c16:uniqueId val="{00000081-A039-4625-8CC2-FF7191EB9979}"/>
+              </c:ext>
+            </c:extLst>
           </c:dPt>
           <c:dPt>
             <c:idx val="65"/>
@@ -1157,6 +1477,11 @@
               </a:ln>
               <a:effectLst/>
             </c:spPr>
+            <c:extLst>
+              <c:ext xmlns:c16="http://schemas.microsoft.com/office/drawing/2014/chart" uri="{C3380CC4-5D6E-409C-BE32-E72D297353CC}">
+                <c16:uniqueId val="{00000083-A039-4625-8CC2-FF7191EB9979}"/>
+              </c:ext>
+            </c:extLst>
           </c:dPt>
           <c:dPt>
             <c:idx val="66"/>
@@ -1172,6 +1497,11 @@
               </a:ln>
               <a:effectLst/>
             </c:spPr>
+            <c:extLst>
+              <c:ext xmlns:c16="http://schemas.microsoft.com/office/drawing/2014/chart" uri="{C3380CC4-5D6E-409C-BE32-E72D297353CC}">
+                <c16:uniqueId val="{00000085-A039-4625-8CC2-FF7191EB9979}"/>
+              </c:ext>
+            </c:extLst>
           </c:dPt>
           <c:dPt>
             <c:idx val="67"/>
@@ -1187,6 +1517,11 @@
               </a:ln>
               <a:effectLst/>
             </c:spPr>
+            <c:extLst>
+              <c:ext xmlns:c16="http://schemas.microsoft.com/office/drawing/2014/chart" uri="{C3380CC4-5D6E-409C-BE32-E72D297353CC}">
+                <c16:uniqueId val="{00000087-A039-4625-8CC2-FF7191EB9979}"/>
+              </c:ext>
+            </c:extLst>
           </c:dPt>
           <c:dPt>
             <c:idx val="68"/>
@@ -1202,6 +1537,11 @@
               </a:ln>
               <a:effectLst/>
             </c:spPr>
+            <c:extLst>
+              <c:ext xmlns:c16="http://schemas.microsoft.com/office/drawing/2014/chart" uri="{C3380CC4-5D6E-409C-BE32-E72D297353CC}">
+                <c16:uniqueId val="{00000089-A039-4625-8CC2-FF7191EB9979}"/>
+              </c:ext>
+            </c:extLst>
           </c:dPt>
           <c:dPt>
             <c:idx val="69"/>
@@ -1217,6 +1557,11 @@
               </a:ln>
               <a:effectLst/>
             </c:spPr>
+            <c:extLst>
+              <c:ext xmlns:c16="http://schemas.microsoft.com/office/drawing/2014/chart" uri="{C3380CC4-5D6E-409C-BE32-E72D297353CC}">
+                <c16:uniqueId val="{0000008B-A039-4625-8CC2-FF7191EB9979}"/>
+              </c:ext>
+            </c:extLst>
           </c:dPt>
           <c:dPt>
             <c:idx val="70"/>
@@ -1232,6 +1577,11 @@
               </a:ln>
               <a:effectLst/>
             </c:spPr>
+            <c:extLst>
+              <c:ext xmlns:c16="http://schemas.microsoft.com/office/drawing/2014/chart" uri="{C3380CC4-5D6E-409C-BE32-E72D297353CC}">
+                <c16:uniqueId val="{0000008D-A039-4625-8CC2-FF7191EB9979}"/>
+              </c:ext>
+            </c:extLst>
           </c:dPt>
           <c:dPt>
             <c:idx val="71"/>
@@ -1247,6 +1597,11 @@
               </a:ln>
               <a:effectLst/>
             </c:spPr>
+            <c:extLst>
+              <c:ext xmlns:c16="http://schemas.microsoft.com/office/drawing/2014/chart" uri="{C3380CC4-5D6E-409C-BE32-E72D297353CC}">
+                <c16:uniqueId val="{0000008F-A039-4625-8CC2-FF7191EB9979}"/>
+              </c:ext>
+            </c:extLst>
           </c:dPt>
           <c:dPt>
             <c:idx val="72"/>
@@ -1262,6 +1617,11 @@
               </a:ln>
               <a:effectLst/>
             </c:spPr>
+            <c:extLst>
+              <c:ext xmlns:c16="http://schemas.microsoft.com/office/drawing/2014/chart" uri="{C3380CC4-5D6E-409C-BE32-E72D297353CC}">
+                <c16:uniqueId val="{00000091-A039-4625-8CC2-FF7191EB9979}"/>
+              </c:ext>
+            </c:extLst>
           </c:dPt>
           <c:dPt>
             <c:idx val="73"/>
@@ -1277,6 +1637,11 @@
               </a:ln>
               <a:effectLst/>
             </c:spPr>
+            <c:extLst>
+              <c:ext xmlns:c16="http://schemas.microsoft.com/office/drawing/2014/chart" uri="{C3380CC4-5D6E-409C-BE32-E72D297353CC}">
+                <c16:uniqueId val="{00000093-A039-4625-8CC2-FF7191EB9979}"/>
+              </c:ext>
+            </c:extLst>
           </c:dPt>
           <c:dPt>
             <c:idx val="74"/>
@@ -1292,6 +1657,11 @@
               </a:ln>
               <a:effectLst/>
             </c:spPr>
+            <c:extLst>
+              <c:ext xmlns:c16="http://schemas.microsoft.com/office/drawing/2014/chart" uri="{C3380CC4-5D6E-409C-BE32-E72D297353CC}">
+                <c16:uniqueId val="{00000095-A039-4625-8CC2-FF7191EB9979}"/>
+              </c:ext>
+            </c:extLst>
           </c:dPt>
           <c:dPt>
             <c:idx val="75"/>
@@ -1307,6 +1677,11 @@
               </a:ln>
               <a:effectLst/>
             </c:spPr>
+            <c:extLst>
+              <c:ext xmlns:c16="http://schemas.microsoft.com/office/drawing/2014/chart" uri="{C3380CC4-5D6E-409C-BE32-E72D297353CC}">
+                <c16:uniqueId val="{00000097-A039-4625-8CC2-FF7191EB9979}"/>
+              </c:ext>
+            </c:extLst>
           </c:dPt>
           <c:dPt>
             <c:idx val="76"/>
@@ -1322,6 +1697,11 @@
               </a:ln>
               <a:effectLst/>
             </c:spPr>
+            <c:extLst>
+              <c:ext xmlns:c16="http://schemas.microsoft.com/office/drawing/2014/chart" uri="{C3380CC4-5D6E-409C-BE32-E72D297353CC}">
+                <c16:uniqueId val="{00000099-A039-4625-8CC2-FF7191EB9979}"/>
+              </c:ext>
+            </c:extLst>
           </c:dPt>
           <c:dPt>
             <c:idx val="77"/>
@@ -1337,6 +1717,11 @@
               </a:ln>
               <a:effectLst/>
             </c:spPr>
+            <c:extLst>
+              <c:ext xmlns:c16="http://schemas.microsoft.com/office/drawing/2014/chart" uri="{C3380CC4-5D6E-409C-BE32-E72D297353CC}">
+                <c16:uniqueId val="{0000009B-A039-4625-8CC2-FF7191EB9979}"/>
+              </c:ext>
+            </c:extLst>
           </c:dPt>
           <c:dPt>
             <c:idx val="78"/>
@@ -1352,6 +1737,11 @@
               </a:ln>
               <a:effectLst/>
             </c:spPr>
+            <c:extLst>
+              <c:ext xmlns:c16="http://schemas.microsoft.com/office/drawing/2014/chart" uri="{C3380CC4-5D6E-409C-BE32-E72D297353CC}">
+                <c16:uniqueId val="{0000009D-A039-4625-8CC2-FF7191EB9979}"/>
+              </c:ext>
+            </c:extLst>
           </c:dPt>
           <c:dPt>
             <c:idx val="79"/>
@@ -1367,6 +1757,11 @@
               </a:ln>
               <a:effectLst/>
             </c:spPr>
+            <c:extLst>
+              <c:ext xmlns:c16="http://schemas.microsoft.com/office/drawing/2014/chart" uri="{C3380CC4-5D6E-409C-BE32-E72D297353CC}">
+                <c16:uniqueId val="{0000009F-A039-4625-8CC2-FF7191EB9979}"/>
+              </c:ext>
+            </c:extLst>
           </c:dPt>
           <c:dPt>
             <c:idx val="80"/>
@@ -1382,6 +1777,11 @@
               </a:ln>
               <a:effectLst/>
             </c:spPr>
+            <c:extLst>
+              <c:ext xmlns:c16="http://schemas.microsoft.com/office/drawing/2014/chart" uri="{C3380CC4-5D6E-409C-BE32-E72D297353CC}">
+                <c16:uniqueId val="{000000A1-A039-4625-8CC2-FF7191EB9979}"/>
+              </c:ext>
+            </c:extLst>
           </c:dPt>
           <c:dPt>
             <c:idx val="81"/>
@@ -1397,6 +1797,11 @@
               </a:ln>
               <a:effectLst/>
             </c:spPr>
+            <c:extLst>
+              <c:ext xmlns:c16="http://schemas.microsoft.com/office/drawing/2014/chart" uri="{C3380CC4-5D6E-409C-BE32-E72D297353CC}">
+                <c16:uniqueId val="{000000A3-A039-4625-8CC2-FF7191EB9979}"/>
+              </c:ext>
+            </c:extLst>
           </c:dPt>
           <c:dPt>
             <c:idx val="82"/>
@@ -1412,6 +1817,11 @@
               </a:ln>
               <a:effectLst/>
             </c:spPr>
+            <c:extLst>
+              <c:ext xmlns:c16="http://schemas.microsoft.com/office/drawing/2014/chart" uri="{C3380CC4-5D6E-409C-BE32-E72D297353CC}">
+                <c16:uniqueId val="{000000A5-A039-4625-8CC2-FF7191EB9979}"/>
+              </c:ext>
+            </c:extLst>
           </c:dPt>
           <c:dPt>
             <c:idx val="83"/>
@@ -1427,6 +1837,11 @@
               </a:ln>
               <a:effectLst/>
             </c:spPr>
+            <c:extLst>
+              <c:ext xmlns:c16="http://schemas.microsoft.com/office/drawing/2014/chart" uri="{C3380CC4-5D6E-409C-BE32-E72D297353CC}">
+                <c16:uniqueId val="{000000A7-A039-4625-8CC2-FF7191EB9979}"/>
+              </c:ext>
+            </c:extLst>
           </c:dPt>
           <c:dPt>
             <c:idx val="84"/>
@@ -1442,6 +1857,11 @@
               </a:ln>
               <a:effectLst/>
             </c:spPr>
+            <c:extLst>
+              <c:ext xmlns:c16="http://schemas.microsoft.com/office/drawing/2014/chart" uri="{C3380CC4-5D6E-409C-BE32-E72D297353CC}">
+                <c16:uniqueId val="{000000A9-A039-4625-8CC2-FF7191EB9979}"/>
+              </c:ext>
+            </c:extLst>
           </c:dPt>
           <c:dPt>
             <c:idx val="85"/>
@@ -1457,6 +1877,11 @@
               </a:ln>
               <a:effectLst/>
             </c:spPr>
+            <c:extLst>
+              <c:ext xmlns:c16="http://schemas.microsoft.com/office/drawing/2014/chart" uri="{C3380CC4-5D6E-409C-BE32-E72D297353CC}">
+                <c16:uniqueId val="{000000AB-A039-4625-8CC2-FF7191EB9979}"/>
+              </c:ext>
+            </c:extLst>
           </c:dPt>
           <c:dPt>
             <c:idx val="86"/>
@@ -1472,6 +1897,11 @@
               </a:ln>
               <a:effectLst/>
             </c:spPr>
+            <c:extLst>
+              <c:ext xmlns:c16="http://schemas.microsoft.com/office/drawing/2014/chart" uri="{C3380CC4-5D6E-409C-BE32-E72D297353CC}">
+                <c16:uniqueId val="{000000AD-A039-4625-8CC2-FF7191EB9979}"/>
+              </c:ext>
+            </c:extLst>
           </c:dPt>
           <c:dPt>
             <c:idx val="87"/>
@@ -1487,6 +1917,11 @@
               </a:ln>
               <a:effectLst/>
             </c:spPr>
+            <c:extLst>
+              <c:ext xmlns:c16="http://schemas.microsoft.com/office/drawing/2014/chart" uri="{C3380CC4-5D6E-409C-BE32-E72D297353CC}">
+                <c16:uniqueId val="{000000AF-A039-4625-8CC2-FF7191EB9979}"/>
+              </c:ext>
+            </c:extLst>
           </c:dPt>
           <c:dPt>
             <c:idx val="88"/>
@@ -1502,6 +1937,11 @@
               </a:ln>
               <a:effectLst/>
             </c:spPr>
+            <c:extLst>
+              <c:ext xmlns:c16="http://schemas.microsoft.com/office/drawing/2014/chart" uri="{C3380CC4-5D6E-409C-BE32-E72D297353CC}">
+                <c16:uniqueId val="{000000B1-A039-4625-8CC2-FF7191EB9979}"/>
+              </c:ext>
+            </c:extLst>
           </c:dPt>
           <c:dPt>
             <c:idx val="89"/>
@@ -1517,6 +1957,11 @@
               </a:ln>
               <a:effectLst/>
             </c:spPr>
+            <c:extLst>
+              <c:ext xmlns:c16="http://schemas.microsoft.com/office/drawing/2014/chart" uri="{C3380CC4-5D6E-409C-BE32-E72D297353CC}">
+                <c16:uniqueId val="{000000B3-A039-4625-8CC2-FF7191EB9979}"/>
+              </c:ext>
+            </c:extLst>
           </c:dPt>
           <c:dPt>
             <c:idx val="90"/>
@@ -1532,6 +1977,11 @@
               </a:ln>
               <a:effectLst/>
             </c:spPr>
+            <c:extLst>
+              <c:ext xmlns:c16="http://schemas.microsoft.com/office/drawing/2014/chart" uri="{C3380CC4-5D6E-409C-BE32-E72D297353CC}">
+                <c16:uniqueId val="{000000B5-A039-4625-8CC2-FF7191EB9979}"/>
+              </c:ext>
+            </c:extLst>
           </c:dPt>
           <c:dPt>
             <c:idx val="91"/>
@@ -1547,6 +1997,11 @@
               </a:ln>
               <a:effectLst/>
             </c:spPr>
+            <c:extLst>
+              <c:ext xmlns:c16="http://schemas.microsoft.com/office/drawing/2014/chart" uri="{C3380CC4-5D6E-409C-BE32-E72D297353CC}">
+                <c16:uniqueId val="{000000B7-A039-4625-8CC2-FF7191EB9979}"/>
+              </c:ext>
+            </c:extLst>
           </c:dPt>
           <c:dPt>
             <c:idx val="92"/>
@@ -1562,6 +2017,11 @@
               </a:ln>
               <a:effectLst/>
             </c:spPr>
+            <c:extLst>
+              <c:ext xmlns:c16="http://schemas.microsoft.com/office/drawing/2014/chart" uri="{C3380CC4-5D6E-409C-BE32-E72D297353CC}">
+                <c16:uniqueId val="{000000B9-A039-4625-8CC2-FF7191EB9979}"/>
+              </c:ext>
+            </c:extLst>
           </c:dPt>
           <c:dPt>
             <c:idx val="93"/>
@@ -1577,6 +2037,11 @@
               </a:ln>
               <a:effectLst/>
             </c:spPr>
+            <c:extLst>
+              <c:ext xmlns:c16="http://schemas.microsoft.com/office/drawing/2014/chart" uri="{C3380CC4-5D6E-409C-BE32-E72D297353CC}">
+                <c16:uniqueId val="{000000BB-A039-4625-8CC2-FF7191EB9979}"/>
+              </c:ext>
+            </c:extLst>
           </c:dPt>
           <c:dPt>
             <c:idx val="94"/>
@@ -1592,6 +2057,11 @@
               </a:ln>
               <a:effectLst/>
             </c:spPr>
+            <c:extLst>
+              <c:ext xmlns:c16="http://schemas.microsoft.com/office/drawing/2014/chart" uri="{C3380CC4-5D6E-409C-BE32-E72D297353CC}">
+                <c16:uniqueId val="{000000BD-A039-4625-8CC2-FF7191EB9979}"/>
+              </c:ext>
+            </c:extLst>
           </c:dPt>
           <c:dPt>
             <c:idx val="95"/>
@@ -1607,6 +2077,11 @@
               </a:ln>
               <a:effectLst/>
             </c:spPr>
+            <c:extLst>
+              <c:ext xmlns:c16="http://schemas.microsoft.com/office/drawing/2014/chart" uri="{C3380CC4-5D6E-409C-BE32-E72D297353CC}">
+                <c16:uniqueId val="{000000BF-A039-4625-8CC2-FF7191EB9979}"/>
+              </c:ext>
+            </c:extLst>
           </c:dPt>
           <c:dPt>
             <c:idx val="96"/>
@@ -1622,6 +2097,11 @@
               </a:ln>
               <a:effectLst/>
             </c:spPr>
+            <c:extLst>
+              <c:ext xmlns:c16="http://schemas.microsoft.com/office/drawing/2014/chart" uri="{C3380CC4-5D6E-409C-BE32-E72D297353CC}">
+                <c16:uniqueId val="{000000C1-A039-4625-8CC2-FF7191EB9979}"/>
+              </c:ext>
+            </c:extLst>
           </c:dPt>
           <c:dPt>
             <c:idx val="97"/>
@@ -1637,6 +2117,11 @@
               </a:ln>
               <a:effectLst/>
             </c:spPr>
+            <c:extLst>
+              <c:ext xmlns:c16="http://schemas.microsoft.com/office/drawing/2014/chart" uri="{C3380CC4-5D6E-409C-BE32-E72D297353CC}">
+                <c16:uniqueId val="{000000C3-A039-4625-8CC2-FF7191EB9979}"/>
+              </c:ext>
+            </c:extLst>
           </c:dPt>
           <c:dPt>
             <c:idx val="98"/>
@@ -1652,6 +2137,11 @@
               </a:ln>
               <a:effectLst/>
             </c:spPr>
+            <c:extLst>
+              <c:ext xmlns:c16="http://schemas.microsoft.com/office/drawing/2014/chart" uri="{C3380CC4-5D6E-409C-BE32-E72D297353CC}">
+                <c16:uniqueId val="{000000C5-A039-4625-8CC2-FF7191EB9979}"/>
+              </c:ext>
+            </c:extLst>
           </c:dPt>
           <c:dPt>
             <c:idx val="99"/>
@@ -1667,6 +2157,11 @@
               </a:ln>
               <a:effectLst/>
             </c:spPr>
+            <c:extLst>
+              <c:ext xmlns:c16="http://schemas.microsoft.com/office/drawing/2014/chart" uri="{C3380CC4-5D6E-409C-BE32-E72D297353CC}">
+                <c16:uniqueId val="{000000C7-A039-4625-8CC2-FF7191EB9979}"/>
+              </c:ext>
+            </c:extLst>
           </c:dPt>
           <c:dPt>
             <c:idx val="100"/>
@@ -1682,6 +2177,11 @@
               </a:ln>
               <a:effectLst/>
             </c:spPr>
+            <c:extLst>
+              <c:ext xmlns:c16="http://schemas.microsoft.com/office/drawing/2014/chart" uri="{C3380CC4-5D6E-409C-BE32-E72D297353CC}">
+                <c16:uniqueId val="{000000C9-A039-4625-8CC2-FF7191EB9979}"/>
+              </c:ext>
+            </c:extLst>
           </c:dPt>
           <c:dPt>
             <c:idx val="101"/>
@@ -1697,6 +2197,11 @@
               </a:ln>
               <a:effectLst/>
             </c:spPr>
+            <c:extLst>
+              <c:ext xmlns:c16="http://schemas.microsoft.com/office/drawing/2014/chart" uri="{C3380CC4-5D6E-409C-BE32-E72D297353CC}">
+                <c16:uniqueId val="{000000CB-A039-4625-8CC2-FF7191EB9979}"/>
+              </c:ext>
+            </c:extLst>
           </c:dPt>
           <c:dPt>
             <c:idx val="102"/>
@@ -1712,6 +2217,11 @@
               </a:ln>
               <a:effectLst/>
             </c:spPr>
+            <c:extLst>
+              <c:ext xmlns:c16="http://schemas.microsoft.com/office/drawing/2014/chart" uri="{C3380CC4-5D6E-409C-BE32-E72D297353CC}">
+                <c16:uniqueId val="{000000CD-A039-4625-8CC2-FF7191EB9979}"/>
+              </c:ext>
+            </c:extLst>
           </c:dPt>
           <c:dPt>
             <c:idx val="103"/>
@@ -1727,6 +2237,11 @@
               </a:ln>
               <a:effectLst/>
             </c:spPr>
+            <c:extLst>
+              <c:ext xmlns:c16="http://schemas.microsoft.com/office/drawing/2014/chart" uri="{C3380CC4-5D6E-409C-BE32-E72D297353CC}">
+                <c16:uniqueId val="{000000CF-A039-4625-8CC2-FF7191EB9979}"/>
+              </c:ext>
+            </c:extLst>
           </c:dPt>
           <c:dPt>
             <c:idx val="104"/>
@@ -1742,6 +2257,11 @@
               </a:ln>
               <a:effectLst/>
             </c:spPr>
+            <c:extLst>
+              <c:ext xmlns:c16="http://schemas.microsoft.com/office/drawing/2014/chart" uri="{C3380CC4-5D6E-409C-BE32-E72D297353CC}">
+                <c16:uniqueId val="{000000D1-A039-4625-8CC2-FF7191EB9979}"/>
+              </c:ext>
+            </c:extLst>
           </c:dPt>
           <c:dPt>
             <c:idx val="105"/>
@@ -1757,6 +2277,11 @@
               </a:ln>
               <a:effectLst/>
             </c:spPr>
+            <c:extLst>
+              <c:ext xmlns:c16="http://schemas.microsoft.com/office/drawing/2014/chart" uri="{C3380CC4-5D6E-409C-BE32-E72D297353CC}">
+                <c16:uniqueId val="{000000D3-A039-4625-8CC2-FF7191EB9979}"/>
+              </c:ext>
+            </c:extLst>
           </c:dPt>
           <c:dPt>
             <c:idx val="106"/>
@@ -1772,6 +2297,11 @@
               </a:ln>
               <a:effectLst/>
             </c:spPr>
+            <c:extLst>
+              <c:ext xmlns:c16="http://schemas.microsoft.com/office/drawing/2014/chart" uri="{C3380CC4-5D6E-409C-BE32-E72D297353CC}">
+                <c16:uniqueId val="{000000D5-A039-4625-8CC2-FF7191EB9979}"/>
+              </c:ext>
+            </c:extLst>
           </c:dPt>
           <c:dPt>
             <c:idx val="107"/>
@@ -1787,6 +2317,11 @@
               </a:ln>
               <a:effectLst/>
             </c:spPr>
+            <c:extLst>
+              <c:ext xmlns:c16="http://schemas.microsoft.com/office/drawing/2014/chart" uri="{C3380CC4-5D6E-409C-BE32-E72D297353CC}">
+                <c16:uniqueId val="{000000D7-A039-4625-8CC2-FF7191EB9979}"/>
+              </c:ext>
+            </c:extLst>
           </c:dPt>
           <c:dPt>
             <c:idx val="108"/>
@@ -1802,6 +2337,11 @@
               </a:ln>
               <a:effectLst/>
             </c:spPr>
+            <c:extLst>
+              <c:ext xmlns:c16="http://schemas.microsoft.com/office/drawing/2014/chart" uri="{C3380CC4-5D6E-409C-BE32-E72D297353CC}">
+                <c16:uniqueId val="{000000D9-A039-4625-8CC2-FF7191EB9979}"/>
+              </c:ext>
+            </c:extLst>
           </c:dPt>
           <c:dPt>
             <c:idx val="109"/>
@@ -1817,6 +2357,11 @@
               </a:ln>
               <a:effectLst/>
             </c:spPr>
+            <c:extLst>
+              <c:ext xmlns:c16="http://schemas.microsoft.com/office/drawing/2014/chart" uri="{C3380CC4-5D6E-409C-BE32-E72D297353CC}">
+                <c16:uniqueId val="{000000DB-A039-4625-8CC2-FF7191EB9979}"/>
+              </c:ext>
+            </c:extLst>
           </c:dPt>
           <c:dPt>
             <c:idx val="110"/>
@@ -1832,6 +2377,11 @@
               </a:ln>
               <a:effectLst/>
             </c:spPr>
+            <c:extLst>
+              <c:ext xmlns:c16="http://schemas.microsoft.com/office/drawing/2014/chart" uri="{C3380CC4-5D6E-409C-BE32-E72D297353CC}">
+                <c16:uniqueId val="{000000DD-A039-4625-8CC2-FF7191EB9979}"/>
+              </c:ext>
+            </c:extLst>
           </c:dPt>
           <c:dPt>
             <c:idx val="111"/>
@@ -1847,6 +2397,11 @@
               </a:ln>
               <a:effectLst/>
             </c:spPr>
+            <c:extLst>
+              <c:ext xmlns:c16="http://schemas.microsoft.com/office/drawing/2014/chart" uri="{C3380CC4-5D6E-409C-BE32-E72D297353CC}">
+                <c16:uniqueId val="{000000DF-A039-4625-8CC2-FF7191EB9979}"/>
+              </c:ext>
+            </c:extLst>
           </c:dPt>
           <c:dPt>
             <c:idx val="112"/>
@@ -1862,6 +2417,11 @@
               </a:ln>
               <a:effectLst/>
             </c:spPr>
+            <c:extLst>
+              <c:ext xmlns:c16="http://schemas.microsoft.com/office/drawing/2014/chart" uri="{C3380CC4-5D6E-409C-BE32-E72D297353CC}">
+                <c16:uniqueId val="{000000E1-A039-4625-8CC2-FF7191EB9979}"/>
+              </c:ext>
+            </c:extLst>
           </c:dPt>
           <c:dPt>
             <c:idx val="113"/>
@@ -1877,6 +2437,11 @@
               </a:ln>
               <a:effectLst/>
             </c:spPr>
+            <c:extLst>
+              <c:ext xmlns:c16="http://schemas.microsoft.com/office/drawing/2014/chart" uri="{C3380CC4-5D6E-409C-BE32-E72D297353CC}">
+                <c16:uniqueId val="{000000E3-A039-4625-8CC2-FF7191EB9979}"/>
+              </c:ext>
+            </c:extLst>
           </c:dPt>
           <c:dPt>
             <c:idx val="114"/>
@@ -1892,6 +2457,11 @@
               </a:ln>
               <a:effectLst/>
             </c:spPr>
+            <c:extLst>
+              <c:ext xmlns:c16="http://schemas.microsoft.com/office/drawing/2014/chart" uri="{C3380CC4-5D6E-409C-BE32-E72D297353CC}">
+                <c16:uniqueId val="{000000E5-A039-4625-8CC2-FF7191EB9979}"/>
+              </c:ext>
+            </c:extLst>
           </c:dPt>
           <c:dPt>
             <c:idx val="115"/>
@@ -1907,6 +2477,11 @@
               </a:ln>
               <a:effectLst/>
             </c:spPr>
+            <c:extLst>
+              <c:ext xmlns:c16="http://schemas.microsoft.com/office/drawing/2014/chart" uri="{C3380CC4-5D6E-409C-BE32-E72D297353CC}">
+                <c16:uniqueId val="{000000E7-A039-4625-8CC2-FF7191EB9979}"/>
+              </c:ext>
+            </c:extLst>
           </c:dPt>
           <c:dPt>
             <c:idx val="116"/>
@@ -1922,6 +2497,11 @@
               </a:ln>
               <a:effectLst/>
             </c:spPr>
+            <c:extLst>
+              <c:ext xmlns:c16="http://schemas.microsoft.com/office/drawing/2014/chart" uri="{C3380CC4-5D6E-409C-BE32-E72D297353CC}">
+                <c16:uniqueId val="{000000E9-A039-4625-8CC2-FF7191EB9979}"/>
+              </c:ext>
+            </c:extLst>
           </c:dPt>
           <c:dPt>
             <c:idx val="117"/>
@@ -1937,6 +2517,11 @@
               </a:ln>
               <a:effectLst/>
             </c:spPr>
+            <c:extLst>
+              <c:ext xmlns:c16="http://schemas.microsoft.com/office/drawing/2014/chart" uri="{C3380CC4-5D6E-409C-BE32-E72D297353CC}">
+                <c16:uniqueId val="{000000EB-A039-4625-8CC2-FF7191EB9979}"/>
+              </c:ext>
+            </c:extLst>
           </c:dPt>
           <c:dPt>
             <c:idx val="118"/>
@@ -1952,6 +2537,11 @@
               </a:ln>
               <a:effectLst/>
             </c:spPr>
+            <c:extLst>
+              <c:ext xmlns:c16="http://schemas.microsoft.com/office/drawing/2014/chart" uri="{C3380CC4-5D6E-409C-BE32-E72D297353CC}">
+                <c16:uniqueId val="{000000ED-A039-4625-8CC2-FF7191EB9979}"/>
+              </c:ext>
+            </c:extLst>
           </c:dPt>
           <c:dPt>
             <c:idx val="119"/>
@@ -1967,6 +2557,11 @@
               </a:ln>
               <a:effectLst/>
             </c:spPr>
+            <c:extLst>
+              <c:ext xmlns:c16="http://schemas.microsoft.com/office/drawing/2014/chart" uri="{C3380CC4-5D6E-409C-BE32-E72D297353CC}">
+                <c16:uniqueId val="{000000EF-A039-4625-8CC2-FF7191EB9979}"/>
+              </c:ext>
+            </c:extLst>
           </c:dPt>
           <c:dPt>
             <c:idx val="120"/>
@@ -1982,6 +2577,11 @@
               </a:ln>
               <a:effectLst/>
             </c:spPr>
+            <c:extLst>
+              <c:ext xmlns:c16="http://schemas.microsoft.com/office/drawing/2014/chart" uri="{C3380CC4-5D6E-409C-BE32-E72D297353CC}">
+                <c16:uniqueId val="{000000F1-A039-4625-8CC2-FF7191EB9979}"/>
+              </c:ext>
+            </c:extLst>
           </c:dPt>
           <c:dPt>
             <c:idx val="121"/>
@@ -1997,6 +2597,11 @@
               </a:ln>
               <a:effectLst/>
             </c:spPr>
+            <c:extLst>
+              <c:ext xmlns:c16="http://schemas.microsoft.com/office/drawing/2014/chart" uri="{C3380CC4-5D6E-409C-BE32-E72D297353CC}">
+                <c16:uniqueId val="{000000F3-A039-4625-8CC2-FF7191EB9979}"/>
+              </c:ext>
+            </c:extLst>
           </c:dPt>
           <c:dPt>
             <c:idx val="122"/>
@@ -2012,6 +2617,11 @@
               </a:ln>
               <a:effectLst/>
             </c:spPr>
+            <c:extLst>
+              <c:ext xmlns:c16="http://schemas.microsoft.com/office/drawing/2014/chart" uri="{C3380CC4-5D6E-409C-BE32-E72D297353CC}">
+                <c16:uniqueId val="{000000F5-A039-4625-8CC2-FF7191EB9979}"/>
+              </c:ext>
+            </c:extLst>
           </c:dPt>
           <c:dPt>
             <c:idx val="123"/>
@@ -2027,6 +2637,11 @@
               </a:ln>
               <a:effectLst/>
             </c:spPr>
+            <c:extLst>
+              <c:ext xmlns:c16="http://schemas.microsoft.com/office/drawing/2014/chart" uri="{C3380CC4-5D6E-409C-BE32-E72D297353CC}">
+                <c16:uniqueId val="{000000F7-A039-4625-8CC2-FF7191EB9979}"/>
+              </c:ext>
+            </c:extLst>
           </c:dPt>
           <c:dPt>
             <c:idx val="124"/>
@@ -2042,6 +2657,11 @@
               </a:ln>
               <a:effectLst/>
             </c:spPr>
+            <c:extLst>
+              <c:ext xmlns:c16="http://schemas.microsoft.com/office/drawing/2014/chart" uri="{C3380CC4-5D6E-409C-BE32-E72D297353CC}">
+                <c16:uniqueId val="{000000F9-A039-4625-8CC2-FF7191EB9979}"/>
+              </c:ext>
+            </c:extLst>
           </c:dPt>
           <c:dPt>
             <c:idx val="125"/>
@@ -2057,6 +2677,11 @@
               </a:ln>
               <a:effectLst/>
             </c:spPr>
+            <c:extLst>
+              <c:ext xmlns:c16="http://schemas.microsoft.com/office/drawing/2014/chart" uri="{C3380CC4-5D6E-409C-BE32-E72D297353CC}">
+                <c16:uniqueId val="{000000FB-A039-4625-8CC2-FF7191EB9979}"/>
+              </c:ext>
+            </c:extLst>
           </c:dPt>
           <c:dPt>
             <c:idx val="126"/>
@@ -2072,6 +2697,11 @@
               </a:ln>
               <a:effectLst/>
             </c:spPr>
+            <c:extLst>
+              <c:ext xmlns:c16="http://schemas.microsoft.com/office/drawing/2014/chart" uri="{C3380CC4-5D6E-409C-BE32-E72D297353CC}">
+                <c16:uniqueId val="{000000FD-A039-4625-8CC2-FF7191EB9979}"/>
+              </c:ext>
+            </c:extLst>
           </c:dPt>
           <c:dPt>
             <c:idx val="127"/>
@@ -2087,6 +2717,11 @@
               </a:ln>
               <a:effectLst/>
             </c:spPr>
+            <c:extLst>
+              <c:ext xmlns:c16="http://schemas.microsoft.com/office/drawing/2014/chart" uri="{C3380CC4-5D6E-409C-BE32-E72D297353CC}">
+                <c16:uniqueId val="{000000FF-A039-4625-8CC2-FF7191EB9979}"/>
+              </c:ext>
+            </c:extLst>
           </c:dPt>
           <c:dPt>
             <c:idx val="128"/>
@@ -2102,6 +2737,11 @@
               </a:ln>
               <a:effectLst/>
             </c:spPr>
+            <c:extLst>
+              <c:ext xmlns:c16="http://schemas.microsoft.com/office/drawing/2014/chart" uri="{C3380CC4-5D6E-409C-BE32-E72D297353CC}">
+                <c16:uniqueId val="{00000101-A039-4625-8CC2-FF7191EB9979}"/>
+              </c:ext>
+            </c:extLst>
           </c:dPt>
           <c:dPt>
             <c:idx val="129"/>
@@ -2117,6 +2757,11 @@
               </a:ln>
               <a:effectLst/>
             </c:spPr>
+            <c:extLst>
+              <c:ext xmlns:c16="http://schemas.microsoft.com/office/drawing/2014/chart" uri="{C3380CC4-5D6E-409C-BE32-E72D297353CC}">
+                <c16:uniqueId val="{00000103-A039-4625-8CC2-FF7191EB9979}"/>
+              </c:ext>
+            </c:extLst>
           </c:dPt>
           <c:dPt>
             <c:idx val="130"/>
@@ -2132,6 +2777,11 @@
               </a:ln>
               <a:effectLst/>
             </c:spPr>
+            <c:extLst>
+              <c:ext xmlns:c16="http://schemas.microsoft.com/office/drawing/2014/chart" uri="{C3380CC4-5D6E-409C-BE32-E72D297353CC}">
+                <c16:uniqueId val="{00000105-A039-4625-8CC2-FF7191EB9979}"/>
+              </c:ext>
+            </c:extLst>
           </c:dPt>
           <c:dPt>
             <c:idx val="131"/>
@@ -2147,6 +2797,11 @@
               </a:ln>
               <a:effectLst/>
             </c:spPr>
+            <c:extLst>
+              <c:ext xmlns:c16="http://schemas.microsoft.com/office/drawing/2014/chart" uri="{C3380CC4-5D6E-409C-BE32-E72D297353CC}">
+                <c16:uniqueId val="{00000107-A039-4625-8CC2-FF7191EB9979}"/>
+              </c:ext>
+            </c:extLst>
           </c:dPt>
           <c:dPt>
             <c:idx val="132"/>
@@ -2162,6 +2817,11 @@
               </a:ln>
               <a:effectLst/>
             </c:spPr>
+            <c:extLst>
+              <c:ext xmlns:c16="http://schemas.microsoft.com/office/drawing/2014/chart" uri="{C3380CC4-5D6E-409C-BE32-E72D297353CC}">
+                <c16:uniqueId val="{00000109-A039-4625-8CC2-FF7191EB9979}"/>
+              </c:ext>
+            </c:extLst>
           </c:dPt>
           <c:dPt>
             <c:idx val="133"/>
@@ -2177,6 +2837,11 @@
               </a:ln>
               <a:effectLst/>
             </c:spPr>
+            <c:extLst>
+              <c:ext xmlns:c16="http://schemas.microsoft.com/office/drawing/2014/chart" uri="{C3380CC4-5D6E-409C-BE32-E72D297353CC}">
+                <c16:uniqueId val="{0000010B-A039-4625-8CC2-FF7191EB9979}"/>
+              </c:ext>
+            </c:extLst>
           </c:dPt>
           <c:dPt>
             <c:idx val="134"/>
@@ -2192,6 +2857,11 @@
               </a:ln>
               <a:effectLst/>
             </c:spPr>
+            <c:extLst>
+              <c:ext xmlns:c16="http://schemas.microsoft.com/office/drawing/2014/chart" uri="{C3380CC4-5D6E-409C-BE32-E72D297353CC}">
+                <c16:uniqueId val="{0000010D-A039-4625-8CC2-FF7191EB9979}"/>
+              </c:ext>
+            </c:extLst>
           </c:dPt>
           <c:dPt>
             <c:idx val="135"/>
@@ -2207,6 +2877,11 @@
               </a:ln>
               <a:effectLst/>
             </c:spPr>
+            <c:extLst>
+              <c:ext xmlns:c16="http://schemas.microsoft.com/office/drawing/2014/chart" uri="{C3380CC4-5D6E-409C-BE32-E72D297353CC}">
+                <c16:uniqueId val="{0000010F-A039-4625-8CC2-FF7191EB9979}"/>
+              </c:ext>
+            </c:extLst>
           </c:dPt>
           <c:dPt>
             <c:idx val="136"/>
@@ -2222,6 +2897,11 @@
               </a:ln>
               <a:effectLst/>
             </c:spPr>
+            <c:extLst>
+              <c:ext xmlns:c16="http://schemas.microsoft.com/office/drawing/2014/chart" uri="{C3380CC4-5D6E-409C-BE32-E72D297353CC}">
+                <c16:uniqueId val="{00000111-A039-4625-8CC2-FF7191EB9979}"/>
+              </c:ext>
+            </c:extLst>
           </c:dPt>
           <c:dPt>
             <c:idx val="137"/>
@@ -2237,6 +2917,11 @@
               </a:ln>
               <a:effectLst/>
             </c:spPr>
+            <c:extLst>
+              <c:ext xmlns:c16="http://schemas.microsoft.com/office/drawing/2014/chart" uri="{C3380CC4-5D6E-409C-BE32-E72D297353CC}">
+                <c16:uniqueId val="{00000113-A039-4625-8CC2-FF7191EB9979}"/>
+              </c:ext>
+            </c:extLst>
           </c:dPt>
           <c:dPt>
             <c:idx val="138"/>
@@ -2252,6 +2937,11 @@
               </a:ln>
               <a:effectLst/>
             </c:spPr>
+            <c:extLst>
+              <c:ext xmlns:c16="http://schemas.microsoft.com/office/drawing/2014/chart" uri="{C3380CC4-5D6E-409C-BE32-E72D297353CC}">
+                <c16:uniqueId val="{00000115-A039-4625-8CC2-FF7191EB9979}"/>
+              </c:ext>
+            </c:extLst>
           </c:dPt>
           <c:dPt>
             <c:idx val="139"/>
@@ -2267,6 +2957,11 @@
               </a:ln>
               <a:effectLst/>
             </c:spPr>
+            <c:extLst>
+              <c:ext xmlns:c16="http://schemas.microsoft.com/office/drawing/2014/chart" uri="{C3380CC4-5D6E-409C-BE32-E72D297353CC}">
+                <c16:uniqueId val="{00000117-A039-4625-8CC2-FF7191EB9979}"/>
+              </c:ext>
+            </c:extLst>
           </c:dPt>
           <c:dPt>
             <c:idx val="140"/>
@@ -2282,6 +2977,11 @@
               </a:ln>
               <a:effectLst/>
             </c:spPr>
+            <c:extLst>
+              <c:ext xmlns:c16="http://schemas.microsoft.com/office/drawing/2014/chart" uri="{C3380CC4-5D6E-409C-BE32-E72D297353CC}">
+                <c16:uniqueId val="{00000119-A039-4625-8CC2-FF7191EB9979}"/>
+              </c:ext>
+            </c:extLst>
           </c:dPt>
           <c:dPt>
             <c:idx val="141"/>
@@ -2297,6 +2997,11 @@
               </a:ln>
               <a:effectLst/>
             </c:spPr>
+            <c:extLst>
+              <c:ext xmlns:c16="http://schemas.microsoft.com/office/drawing/2014/chart" uri="{C3380CC4-5D6E-409C-BE32-E72D297353CC}">
+                <c16:uniqueId val="{0000011B-A039-4625-8CC2-FF7191EB9979}"/>
+              </c:ext>
+            </c:extLst>
           </c:dPt>
           <c:dPt>
             <c:idx val="142"/>
@@ -2312,6 +3017,11 @@
               </a:ln>
               <a:effectLst/>
             </c:spPr>
+            <c:extLst>
+              <c:ext xmlns:c16="http://schemas.microsoft.com/office/drawing/2014/chart" uri="{C3380CC4-5D6E-409C-BE32-E72D297353CC}">
+                <c16:uniqueId val="{0000011D-A039-4625-8CC2-FF7191EB9979}"/>
+              </c:ext>
+            </c:extLst>
           </c:dPt>
           <c:dPt>
             <c:idx val="143"/>
@@ -2327,6 +3037,11 @@
               </a:ln>
               <a:effectLst/>
             </c:spPr>
+            <c:extLst>
+              <c:ext xmlns:c16="http://schemas.microsoft.com/office/drawing/2014/chart" uri="{C3380CC4-5D6E-409C-BE32-E72D297353CC}">
+                <c16:uniqueId val="{0000011F-A039-4625-8CC2-FF7191EB9979}"/>
+              </c:ext>
+            </c:extLst>
           </c:dPt>
           <c:dPt>
             <c:idx val="144"/>
@@ -2342,6 +3057,11 @@
               </a:ln>
               <a:effectLst/>
             </c:spPr>
+            <c:extLst>
+              <c:ext xmlns:c16="http://schemas.microsoft.com/office/drawing/2014/chart" uri="{C3380CC4-5D6E-409C-BE32-E72D297353CC}">
+                <c16:uniqueId val="{00000121-A039-4625-8CC2-FF7191EB9979}"/>
+              </c:ext>
+            </c:extLst>
           </c:dPt>
           <c:dPt>
             <c:idx val="145"/>
@@ -2357,6 +3077,11 @@
               </a:ln>
               <a:effectLst/>
             </c:spPr>
+            <c:extLst>
+              <c:ext xmlns:c16="http://schemas.microsoft.com/office/drawing/2014/chart" uri="{C3380CC4-5D6E-409C-BE32-E72D297353CC}">
+                <c16:uniqueId val="{00000123-A039-4625-8CC2-FF7191EB9979}"/>
+              </c:ext>
+            </c:extLst>
           </c:dPt>
           <c:dPt>
             <c:idx val="146"/>
@@ -2372,6 +3097,11 @@
               </a:ln>
               <a:effectLst/>
             </c:spPr>
+            <c:extLst>
+              <c:ext xmlns:c16="http://schemas.microsoft.com/office/drawing/2014/chart" uri="{C3380CC4-5D6E-409C-BE32-E72D297353CC}">
+                <c16:uniqueId val="{00000125-A039-4625-8CC2-FF7191EB9979}"/>
+              </c:ext>
+            </c:extLst>
           </c:dPt>
           <c:dPt>
             <c:idx val="147"/>
@@ -2387,6 +3117,11 @@
               </a:ln>
               <a:effectLst/>
             </c:spPr>
+            <c:extLst>
+              <c:ext xmlns:c16="http://schemas.microsoft.com/office/drawing/2014/chart" uri="{C3380CC4-5D6E-409C-BE32-E72D297353CC}">
+                <c16:uniqueId val="{00000127-A039-4625-8CC2-FF7191EB9979}"/>
+              </c:ext>
+            </c:extLst>
           </c:dPt>
           <c:dPt>
             <c:idx val="148"/>
@@ -2402,6 +3137,11 @@
               </a:ln>
               <a:effectLst/>
             </c:spPr>
+            <c:extLst>
+              <c:ext xmlns:c16="http://schemas.microsoft.com/office/drawing/2014/chart" uri="{C3380CC4-5D6E-409C-BE32-E72D297353CC}">
+                <c16:uniqueId val="{00000129-A039-4625-8CC2-FF7191EB9979}"/>
+              </c:ext>
+            </c:extLst>
           </c:dPt>
           <c:dPt>
             <c:idx val="149"/>
@@ -2417,6 +3157,11 @@
               </a:ln>
               <a:effectLst/>
             </c:spPr>
+            <c:extLst>
+              <c:ext xmlns:c16="http://schemas.microsoft.com/office/drawing/2014/chart" uri="{C3380CC4-5D6E-409C-BE32-E72D297353CC}">
+                <c16:uniqueId val="{0000012B-A039-4625-8CC2-FF7191EB9979}"/>
+              </c:ext>
+            </c:extLst>
           </c:dPt>
           <c:dPt>
             <c:idx val="150"/>
@@ -2474,6 +3219,11 @@
               </a:ln>
               <a:effectLst/>
             </c:spPr>
+            <c:extLst>
+              <c:ext xmlns:c16="http://schemas.microsoft.com/office/drawing/2014/chart" uri="{C3380CC4-5D6E-409C-BE32-E72D297353CC}">
+                <c16:uniqueId val="{00000131-A039-4625-8CC2-FF7191EB9979}"/>
+              </c:ext>
+            </c:extLst>
           </c:dPt>
           <c:dPt>
             <c:idx val="153"/>
@@ -2489,6 +3239,11 @@
               </a:ln>
               <a:effectLst/>
             </c:spPr>
+            <c:extLst>
+              <c:ext xmlns:c16="http://schemas.microsoft.com/office/drawing/2014/chart" uri="{C3380CC4-5D6E-409C-BE32-E72D297353CC}">
+                <c16:uniqueId val="{00000133-A039-4625-8CC2-FF7191EB9979}"/>
+              </c:ext>
+            </c:extLst>
           </c:dPt>
           <c:dPt>
             <c:idx val="154"/>
@@ -2504,6 +3259,11 @@
               </a:ln>
               <a:effectLst/>
             </c:spPr>
+            <c:extLst>
+              <c:ext xmlns:c16="http://schemas.microsoft.com/office/drawing/2014/chart" uri="{C3380CC4-5D6E-409C-BE32-E72D297353CC}">
+                <c16:uniqueId val="{00000135-A039-4625-8CC2-FF7191EB9979}"/>
+              </c:ext>
+            </c:extLst>
           </c:dPt>
           <c:dPt>
             <c:idx val="155"/>
@@ -2519,6 +3279,11 @@
               </a:ln>
               <a:effectLst/>
             </c:spPr>
+            <c:extLst>
+              <c:ext xmlns:c16="http://schemas.microsoft.com/office/drawing/2014/chart" uri="{C3380CC4-5D6E-409C-BE32-E72D297353CC}">
+                <c16:uniqueId val="{00000137-A039-4625-8CC2-FF7191EB9979}"/>
+              </c:ext>
+            </c:extLst>
           </c:dPt>
           <c:dPt>
             <c:idx val="156"/>
@@ -2534,6 +3299,11 @@
               </a:ln>
               <a:effectLst/>
             </c:spPr>
+            <c:extLst>
+              <c:ext xmlns:c16="http://schemas.microsoft.com/office/drawing/2014/chart" uri="{C3380CC4-5D6E-409C-BE32-E72D297353CC}">
+                <c16:uniqueId val="{00000139-A039-4625-8CC2-FF7191EB9979}"/>
+              </c:ext>
+            </c:extLst>
           </c:dPt>
           <c:dPt>
             <c:idx val="157"/>
@@ -2549,6 +3319,11 @@
               </a:ln>
               <a:effectLst/>
             </c:spPr>
+            <c:extLst>
+              <c:ext xmlns:c16="http://schemas.microsoft.com/office/drawing/2014/chart" uri="{C3380CC4-5D6E-409C-BE32-E72D297353CC}">
+                <c16:uniqueId val="{0000013B-A039-4625-8CC2-FF7191EB9979}"/>
+              </c:ext>
+            </c:extLst>
           </c:dPt>
           <c:dPt>
             <c:idx val="158"/>
@@ -2564,6 +3339,11 @@
               </a:ln>
               <a:effectLst/>
             </c:spPr>
+            <c:extLst>
+              <c:ext xmlns:c16="http://schemas.microsoft.com/office/drawing/2014/chart" uri="{C3380CC4-5D6E-409C-BE32-E72D297353CC}">
+                <c16:uniqueId val="{0000013D-A039-4625-8CC2-FF7191EB9979}"/>
+              </c:ext>
+            </c:extLst>
           </c:dPt>
           <c:dPt>
             <c:idx val="159"/>
@@ -2579,6 +3359,11 @@
               </a:ln>
               <a:effectLst/>
             </c:spPr>
+            <c:extLst>
+              <c:ext xmlns:c16="http://schemas.microsoft.com/office/drawing/2014/chart" uri="{C3380CC4-5D6E-409C-BE32-E72D297353CC}">
+                <c16:uniqueId val="{0000013F-A039-4625-8CC2-FF7191EB9979}"/>
+              </c:ext>
+            </c:extLst>
           </c:dPt>
           <c:dPt>
             <c:idx val="160"/>
@@ -2594,6 +3379,11 @@
               </a:ln>
               <a:effectLst/>
             </c:spPr>
+            <c:extLst>
+              <c:ext xmlns:c16="http://schemas.microsoft.com/office/drawing/2014/chart" uri="{C3380CC4-5D6E-409C-BE32-E72D297353CC}">
+                <c16:uniqueId val="{00000141-A039-4625-8CC2-FF7191EB9979}"/>
+              </c:ext>
+            </c:extLst>
           </c:dPt>
           <c:dPt>
             <c:idx val="161"/>
@@ -2609,6 +3399,11 @@
               </a:ln>
               <a:effectLst/>
             </c:spPr>
+            <c:extLst>
+              <c:ext xmlns:c16="http://schemas.microsoft.com/office/drawing/2014/chart" uri="{C3380CC4-5D6E-409C-BE32-E72D297353CC}">
+                <c16:uniqueId val="{00000143-A039-4625-8CC2-FF7191EB9979}"/>
+              </c:ext>
+            </c:extLst>
           </c:dPt>
           <c:dPt>
             <c:idx val="162"/>
@@ -2624,6 +3419,11 @@
               </a:ln>
               <a:effectLst/>
             </c:spPr>
+            <c:extLst>
+              <c:ext xmlns:c16="http://schemas.microsoft.com/office/drawing/2014/chart" uri="{C3380CC4-5D6E-409C-BE32-E72D297353CC}">
+                <c16:uniqueId val="{00000145-A039-4625-8CC2-FF7191EB9979}"/>
+              </c:ext>
+            </c:extLst>
           </c:dPt>
           <c:dPt>
             <c:idx val="163"/>
@@ -2639,6 +3439,11 @@
               </a:ln>
               <a:effectLst/>
             </c:spPr>
+            <c:extLst>
+              <c:ext xmlns:c16="http://schemas.microsoft.com/office/drawing/2014/chart" uri="{C3380CC4-5D6E-409C-BE32-E72D297353CC}">
+                <c16:uniqueId val="{00000147-A039-4625-8CC2-FF7191EB9979}"/>
+              </c:ext>
+            </c:extLst>
           </c:dPt>
           <c:dPt>
             <c:idx val="164"/>
@@ -2654,6 +3459,11 @@
               </a:ln>
               <a:effectLst/>
             </c:spPr>
+            <c:extLst>
+              <c:ext xmlns:c16="http://schemas.microsoft.com/office/drawing/2014/chart" uri="{C3380CC4-5D6E-409C-BE32-E72D297353CC}">
+                <c16:uniqueId val="{00000149-A039-4625-8CC2-FF7191EB9979}"/>
+              </c:ext>
+            </c:extLst>
           </c:dPt>
           <c:dPt>
             <c:idx val="165"/>
@@ -2669,6 +3479,11 @@
               </a:ln>
               <a:effectLst/>
             </c:spPr>
+            <c:extLst>
+              <c:ext xmlns:c16="http://schemas.microsoft.com/office/drawing/2014/chart" uri="{C3380CC4-5D6E-409C-BE32-E72D297353CC}">
+                <c16:uniqueId val="{0000014B-A039-4625-8CC2-FF7191EB9979}"/>
+              </c:ext>
+            </c:extLst>
           </c:dPt>
           <c:dPt>
             <c:idx val="166"/>
@@ -2684,6 +3499,11 @@
               </a:ln>
               <a:effectLst/>
             </c:spPr>
+            <c:extLst>
+              <c:ext xmlns:c16="http://schemas.microsoft.com/office/drawing/2014/chart" uri="{C3380CC4-5D6E-409C-BE32-E72D297353CC}">
+                <c16:uniqueId val="{0000014D-A039-4625-8CC2-FF7191EB9979}"/>
+              </c:ext>
+            </c:extLst>
           </c:dPt>
           <c:dPt>
             <c:idx val="167"/>
@@ -2699,6 +3519,11 @@
               </a:ln>
               <a:effectLst/>
             </c:spPr>
+            <c:extLst>
+              <c:ext xmlns:c16="http://schemas.microsoft.com/office/drawing/2014/chart" uri="{C3380CC4-5D6E-409C-BE32-E72D297353CC}">
+                <c16:uniqueId val="{0000014F-A039-4625-8CC2-FF7191EB9979}"/>
+              </c:ext>
+            </c:extLst>
           </c:dPt>
           <c:dPt>
             <c:idx val="168"/>
@@ -2714,6 +3539,11 @@
               </a:ln>
               <a:effectLst/>
             </c:spPr>
+            <c:extLst>
+              <c:ext xmlns:c16="http://schemas.microsoft.com/office/drawing/2014/chart" uri="{C3380CC4-5D6E-409C-BE32-E72D297353CC}">
+                <c16:uniqueId val="{00000151-A039-4625-8CC2-FF7191EB9979}"/>
+              </c:ext>
+            </c:extLst>
           </c:dPt>
           <c:dPt>
             <c:idx val="169"/>
@@ -2729,6 +3559,11 @@
               </a:ln>
               <a:effectLst/>
             </c:spPr>
+            <c:extLst>
+              <c:ext xmlns:c16="http://schemas.microsoft.com/office/drawing/2014/chart" uri="{C3380CC4-5D6E-409C-BE32-E72D297353CC}">
+                <c16:uniqueId val="{00000153-A039-4625-8CC2-FF7191EB9979}"/>
+              </c:ext>
+            </c:extLst>
           </c:dPt>
           <c:dPt>
             <c:idx val="170"/>
@@ -2744,6 +3579,11 @@
               </a:ln>
               <a:effectLst/>
             </c:spPr>
+            <c:extLst>
+              <c:ext xmlns:c16="http://schemas.microsoft.com/office/drawing/2014/chart" uri="{C3380CC4-5D6E-409C-BE32-E72D297353CC}">
+                <c16:uniqueId val="{00000155-A039-4625-8CC2-FF7191EB9979}"/>
+              </c:ext>
+            </c:extLst>
           </c:dPt>
           <c:dPt>
             <c:idx val="171"/>
@@ -2759,6 +3599,11 @@
               </a:ln>
               <a:effectLst/>
             </c:spPr>
+            <c:extLst>
+              <c:ext xmlns:c16="http://schemas.microsoft.com/office/drawing/2014/chart" uri="{C3380CC4-5D6E-409C-BE32-E72D297353CC}">
+                <c16:uniqueId val="{00000157-A039-4625-8CC2-FF7191EB9979}"/>
+              </c:ext>
+            </c:extLst>
           </c:dPt>
           <c:dPt>
             <c:idx val="172"/>
@@ -2774,6 +3619,11 @@
               </a:ln>
               <a:effectLst/>
             </c:spPr>
+            <c:extLst>
+              <c:ext xmlns:c16="http://schemas.microsoft.com/office/drawing/2014/chart" uri="{C3380CC4-5D6E-409C-BE32-E72D297353CC}">
+                <c16:uniqueId val="{00000159-A039-4625-8CC2-FF7191EB9979}"/>
+              </c:ext>
+            </c:extLst>
           </c:dPt>
           <c:dPt>
             <c:idx val="173"/>
@@ -2789,6 +3639,11 @@
               </a:ln>
               <a:effectLst/>
             </c:spPr>
+            <c:extLst>
+              <c:ext xmlns:c16="http://schemas.microsoft.com/office/drawing/2014/chart" uri="{C3380CC4-5D6E-409C-BE32-E72D297353CC}">
+                <c16:uniqueId val="{0000015B-A039-4625-8CC2-FF7191EB9979}"/>
+              </c:ext>
+            </c:extLst>
           </c:dPt>
           <c:dPt>
             <c:idx val="174"/>
@@ -2804,6 +3659,11 @@
               </a:ln>
               <a:effectLst/>
             </c:spPr>
+            <c:extLst>
+              <c:ext xmlns:c16="http://schemas.microsoft.com/office/drawing/2014/chart" uri="{C3380CC4-5D6E-409C-BE32-E72D297353CC}">
+                <c16:uniqueId val="{0000015D-A039-4625-8CC2-FF7191EB9979}"/>
+              </c:ext>
+            </c:extLst>
           </c:dPt>
           <c:dPt>
             <c:idx val="175"/>
@@ -2819,6 +3679,11 @@
               </a:ln>
               <a:effectLst/>
             </c:spPr>
+            <c:extLst>
+              <c:ext xmlns:c16="http://schemas.microsoft.com/office/drawing/2014/chart" uri="{C3380CC4-5D6E-409C-BE32-E72D297353CC}">
+                <c16:uniqueId val="{0000015F-A039-4625-8CC2-FF7191EB9979}"/>
+              </c:ext>
+            </c:extLst>
           </c:dPt>
           <c:dPt>
             <c:idx val="176"/>
@@ -2834,6 +3699,11 @@
               </a:ln>
               <a:effectLst/>
             </c:spPr>
+            <c:extLst>
+              <c:ext xmlns:c16="http://schemas.microsoft.com/office/drawing/2014/chart" uri="{C3380CC4-5D6E-409C-BE32-E72D297353CC}">
+                <c16:uniqueId val="{00000161-A039-4625-8CC2-FF7191EB9979}"/>
+              </c:ext>
+            </c:extLst>
           </c:dPt>
           <c:dPt>
             <c:idx val="177"/>
@@ -2849,6 +3719,11 @@
               </a:ln>
               <a:effectLst/>
             </c:spPr>
+            <c:extLst>
+              <c:ext xmlns:c16="http://schemas.microsoft.com/office/drawing/2014/chart" uri="{C3380CC4-5D6E-409C-BE32-E72D297353CC}">
+                <c16:uniqueId val="{00000163-A039-4625-8CC2-FF7191EB9979}"/>
+              </c:ext>
+            </c:extLst>
           </c:dPt>
           <c:dPt>
             <c:idx val="178"/>
@@ -2884,6 +3759,11 @@
               </a:ln>
               <a:effectLst/>
             </c:spPr>
+            <c:extLst>
+              <c:ext xmlns:c16="http://schemas.microsoft.com/office/drawing/2014/chart" uri="{C3380CC4-5D6E-409C-BE32-E72D297353CC}">
+                <c16:uniqueId val="{00000167-A039-4625-8CC2-FF7191EB9979}"/>
+              </c:ext>
+            </c:extLst>
           </c:dPt>
           <c:cat>
             <c:strRef>
@@ -4511,7 +5391,7 @@
           <a:p>
             <a:fld id="{16D5409C-EACC-4839-A6F0-5130D1B1002B}" type="datetimeFigureOut">
               <a:rPr lang="en-HK" smtClean="0"/>
-              <a:t>13/7/2022</a:t>
+              <a:t>27/7/2022</a:t>
             </a:fld>
             <a:endParaRPr lang="en-HK"/>
           </a:p>
@@ -4711,7 +5591,7 @@
           <a:p>
             <a:fld id="{16D5409C-EACC-4839-A6F0-5130D1B1002B}" type="datetimeFigureOut">
               <a:rPr lang="en-HK" smtClean="0"/>
-              <a:t>13/7/2022</a:t>
+              <a:t>27/7/2022</a:t>
             </a:fld>
             <a:endParaRPr lang="en-HK"/>
           </a:p>
@@ -4921,7 +5801,7 @@
           <a:p>
             <a:fld id="{16D5409C-EACC-4839-A6F0-5130D1B1002B}" type="datetimeFigureOut">
               <a:rPr lang="en-HK" smtClean="0"/>
-              <a:t>13/7/2022</a:t>
+              <a:t>27/7/2022</a:t>
             </a:fld>
             <a:endParaRPr lang="en-HK"/>
           </a:p>
@@ -5121,7 +6001,7 @@
           <a:p>
             <a:fld id="{16D5409C-EACC-4839-A6F0-5130D1B1002B}" type="datetimeFigureOut">
               <a:rPr lang="en-HK" smtClean="0"/>
-              <a:t>13/7/2022</a:t>
+              <a:t>27/7/2022</a:t>
             </a:fld>
             <a:endParaRPr lang="en-HK"/>
           </a:p>
@@ -5397,7 +6277,7 @@
           <a:p>
             <a:fld id="{16D5409C-EACC-4839-A6F0-5130D1B1002B}" type="datetimeFigureOut">
               <a:rPr lang="en-HK" smtClean="0"/>
-              <a:t>13/7/2022</a:t>
+              <a:t>27/7/2022</a:t>
             </a:fld>
             <a:endParaRPr lang="en-HK"/>
           </a:p>
@@ -5665,7 +6545,7 @@
           <a:p>
             <a:fld id="{16D5409C-EACC-4839-A6F0-5130D1B1002B}" type="datetimeFigureOut">
               <a:rPr lang="en-HK" smtClean="0"/>
-              <a:t>13/7/2022</a:t>
+              <a:t>27/7/2022</a:t>
             </a:fld>
             <a:endParaRPr lang="en-HK"/>
           </a:p>
@@ -6080,7 +6960,7 @@
           <a:p>
             <a:fld id="{16D5409C-EACC-4839-A6F0-5130D1B1002B}" type="datetimeFigureOut">
               <a:rPr lang="en-HK" smtClean="0"/>
-              <a:t>13/7/2022</a:t>
+              <a:t>27/7/2022</a:t>
             </a:fld>
             <a:endParaRPr lang="en-HK"/>
           </a:p>
@@ -6222,7 +7102,7 @@
           <a:p>
             <a:fld id="{16D5409C-EACC-4839-A6F0-5130D1B1002B}" type="datetimeFigureOut">
               <a:rPr lang="en-HK" smtClean="0"/>
-              <a:t>13/7/2022</a:t>
+              <a:t>27/7/2022</a:t>
             </a:fld>
             <a:endParaRPr lang="en-HK"/>
           </a:p>
@@ -6335,7 +7215,7 @@
           <a:p>
             <a:fld id="{16D5409C-EACC-4839-A6F0-5130D1B1002B}" type="datetimeFigureOut">
               <a:rPr lang="en-HK" smtClean="0"/>
-              <a:t>13/7/2022</a:t>
+              <a:t>27/7/2022</a:t>
             </a:fld>
             <a:endParaRPr lang="en-HK"/>
           </a:p>
@@ -6648,7 +7528,7 @@
           <a:p>
             <a:fld id="{16D5409C-EACC-4839-A6F0-5130D1B1002B}" type="datetimeFigureOut">
               <a:rPr lang="en-HK" smtClean="0"/>
-              <a:t>13/7/2022</a:t>
+              <a:t>27/7/2022</a:t>
             </a:fld>
             <a:endParaRPr lang="en-HK"/>
           </a:p>
@@ -6937,7 +7817,7 @@
           <a:p>
             <a:fld id="{16D5409C-EACC-4839-A6F0-5130D1B1002B}" type="datetimeFigureOut">
               <a:rPr lang="en-HK" smtClean="0"/>
-              <a:t>13/7/2022</a:t>
+              <a:t>27/7/2022</a:t>
             </a:fld>
             <a:endParaRPr lang="en-HK"/>
           </a:p>
@@ -7180,7 +8060,7 @@
           <a:p>
             <a:fld id="{16D5409C-EACC-4839-A6F0-5130D1B1002B}" type="datetimeFigureOut">
               <a:rPr lang="en-HK" smtClean="0"/>
-              <a:t>13/7/2022</a:t>
+              <a:t>27/7/2022</a:t>
             </a:fld>
             <a:endParaRPr lang="en-HK"/>
           </a:p>
@@ -7597,6 +8477,76 @@
           <a:chExt cx="0" cy="0"/>
         </a:xfrm>
       </p:grpSpPr>
+      <p:pic>
+        <p:nvPicPr>
+          <p:cNvPr id="51" name="图片 50" descr="手上戴着戒指&#10;&#10;描述已自动生成">
+            <a:extLst>
+              <a:ext uri="{FF2B5EF4-FFF2-40B4-BE49-F238E27FC236}">
+                <a16:creationId xmlns:a16="http://schemas.microsoft.com/office/drawing/2014/main" id="{49160658-50A2-2AD4-B68D-BEA0852A0964}"/>
+              </a:ext>
+            </a:extLst>
+          </p:cNvPr>
+          <p:cNvPicPr>
+            <a:picLocks noChangeAspect="1"/>
+          </p:cNvPicPr>
+          <p:nvPr/>
+        </p:nvPicPr>
+        <p:blipFill rotWithShape="1">
+          <a:blip r:embed="rId2">
+            <a:extLst>
+              <a:ext uri="{28A0092B-C50C-407E-A947-70E740481C1C}">
+                <a14:useLocalDpi xmlns:a14="http://schemas.microsoft.com/office/drawing/2010/main" val="0"/>
+              </a:ext>
+            </a:extLst>
+          </a:blip>
+          <a:srcRect l="7587" r="18426"/>
+          <a:stretch/>
+        </p:blipFill>
+        <p:spPr>
+          <a:xfrm rot="12664708">
+            <a:off x="4218310" y="3700571"/>
+            <a:ext cx="3963748" cy="1912381"/>
+          </a:xfrm>
+          <a:prstGeom prst="rect">
+            <a:avLst/>
+          </a:prstGeom>
+        </p:spPr>
+      </p:pic>
+      <p:pic>
+        <p:nvPicPr>
+          <p:cNvPr id="50" name="图片 49" descr="手上戴着戒指&#10;&#10;描述已自动生成">
+            <a:extLst>
+              <a:ext uri="{FF2B5EF4-FFF2-40B4-BE49-F238E27FC236}">
+                <a16:creationId xmlns:a16="http://schemas.microsoft.com/office/drawing/2014/main" id="{B05E825A-FD53-C2E7-62AD-F3F2230B756B}"/>
+              </a:ext>
+            </a:extLst>
+          </p:cNvPr>
+          <p:cNvPicPr>
+            <a:picLocks noChangeAspect="1"/>
+          </p:cNvPicPr>
+          <p:nvPr/>
+        </p:nvPicPr>
+        <p:blipFill rotWithShape="1">
+          <a:blip r:embed="rId2">
+            <a:extLst>
+              <a:ext uri="{28A0092B-C50C-407E-A947-70E740481C1C}">
+                <a14:useLocalDpi xmlns:a14="http://schemas.microsoft.com/office/drawing/2010/main" val="0"/>
+              </a:ext>
+            </a:extLst>
+          </a:blip>
+          <a:srcRect l="7587" r="18426"/>
+          <a:stretch/>
+        </p:blipFill>
+        <p:spPr>
+          <a:xfrm rot="20483131">
+            <a:off x="4394482" y="422886"/>
+            <a:ext cx="3963748" cy="1912381"/>
+          </a:xfrm>
+          <a:prstGeom prst="rect">
+            <a:avLst/>
+          </a:prstGeom>
+        </p:spPr>
+      </p:pic>
       <p:sp>
         <p:nvSpPr>
           <p:cNvPr id="5" name="矩形 4">
@@ -7611,15 +8561,13 @@
         </p:nvSpPr>
         <p:spPr>
           <a:xfrm rot="20416826">
-            <a:off x="1543601" y="840977"/>
+            <a:off x="5234558" y="877701"/>
             <a:ext cx="2059477" cy="1105289"/>
           </a:xfrm>
           <a:prstGeom prst="rect">
             <a:avLst/>
           </a:prstGeom>
-          <a:solidFill>
-            <a:schemeClr val="bg1"/>
-          </a:solidFill>
+          <a:noFill/>
           <a:ln w="19050">
             <a:solidFill>
               <a:schemeClr val="tx1"/>
@@ -7665,15 +8613,13 @@
         </p:nvSpPr>
         <p:spPr>
           <a:xfrm rot="1910871">
-            <a:off x="1525891" y="3385774"/>
+            <a:off x="5213235" y="4138523"/>
             <a:ext cx="2059477" cy="1105289"/>
           </a:xfrm>
           <a:prstGeom prst="rect">
             <a:avLst/>
           </a:prstGeom>
-          <a:solidFill>
-            <a:schemeClr val="bg1"/>
-          </a:solidFill>
+          <a:noFill/>
           <a:ln w="19050">
             <a:solidFill>
               <a:schemeClr val="tx1"/>
@@ -7719,7 +8665,7 @@
         </p:nvCxnSpPr>
         <p:spPr>
           <a:xfrm>
-            <a:off x="1978067" y="2925615"/>
+            <a:off x="5665411" y="3678364"/>
             <a:ext cx="2266122" cy="0"/>
           </a:xfrm>
           <a:prstGeom prst="straightConnector1">
@@ -7761,7 +8707,7 @@
         </p:nvCxnSpPr>
         <p:spPr>
           <a:xfrm>
-            <a:off x="3355450" y="525935"/>
+            <a:off x="7046407" y="562659"/>
             <a:ext cx="906449" cy="0"/>
           </a:xfrm>
           <a:prstGeom prst="straightConnector1">
@@ -7803,7 +8749,7 @@
         </p:nvCxnSpPr>
         <p:spPr>
           <a:xfrm flipH="1">
-            <a:off x="930303" y="525935"/>
+            <a:off x="4621260" y="562659"/>
             <a:ext cx="2425147" cy="867686"/>
           </a:xfrm>
           <a:prstGeom prst="straightConnector1">
@@ -7847,7 +8793,7 @@
         </p:nvCxnSpPr>
         <p:spPr>
           <a:xfrm>
-            <a:off x="1978067" y="2925615"/>
+            <a:off x="5665411" y="3678364"/>
             <a:ext cx="2075291" cy="1274358"/>
           </a:xfrm>
           <a:prstGeom prst="straightConnector1">
@@ -7889,7 +8835,7 @@
         </p:nvSpPr>
         <p:spPr>
           <a:xfrm>
-            <a:off x="2550479" y="1370761"/>
+            <a:off x="6241436" y="1407485"/>
             <a:ext cx="45719" cy="45719"/>
           </a:xfrm>
           <a:prstGeom prst="flowChartConnector">
@@ -7935,7 +8881,7 @@
         </p:nvSpPr>
         <p:spPr>
           <a:xfrm>
-            <a:off x="2532768" y="3915558"/>
+            <a:off x="6220112" y="4668307"/>
             <a:ext cx="45719" cy="45719"/>
           </a:xfrm>
           <a:prstGeom prst="flowChartConnector">
@@ -7981,7 +8927,7 @@
         </p:nvSpPr>
         <p:spPr>
           <a:xfrm rot="20431072">
-            <a:off x="1822427" y="1016546"/>
+            <a:off x="5513384" y="1053270"/>
             <a:ext cx="1393295" cy="369332"/>
           </a:xfrm>
           <a:prstGeom prst="rect">
@@ -8020,7 +8966,7 @@
         </p:nvSpPr>
         <p:spPr>
           <a:xfrm rot="1950429">
-            <a:off x="1992367" y="3622554"/>
+            <a:off x="5679711" y="4375303"/>
             <a:ext cx="1393295" cy="369332"/>
           </a:xfrm>
           <a:prstGeom prst="rect">
@@ -8059,7 +9005,7 @@
         </p:nvSpPr>
         <p:spPr>
           <a:xfrm rot="1939082" flipH="1">
-            <a:off x="1693753" y="4390932"/>
+            <a:off x="5381097" y="5143681"/>
             <a:ext cx="1065326" cy="369332"/>
           </a:xfrm>
           <a:prstGeom prst="rect">
@@ -8094,7 +9040,7 @@
         </p:nvSpPr>
         <p:spPr>
           <a:xfrm rot="20507939" flipH="1">
-            <a:off x="2279399" y="1873572"/>
+            <a:off x="5970356" y="1910296"/>
             <a:ext cx="1065326" cy="369332"/>
           </a:xfrm>
           <a:prstGeom prst="rect">
@@ -8129,7 +9075,7 @@
         </p:nvSpPr>
         <p:spPr>
           <a:xfrm rot="4189085">
-            <a:off x="782666" y="1629654"/>
+            <a:off x="4431294" y="1648037"/>
             <a:ext cx="1248697" cy="646331"/>
           </a:xfrm>
           <a:prstGeom prst="rect">
@@ -8167,7 +9113,7 @@
         </p:nvSpPr>
         <p:spPr>
           <a:xfrm rot="18097314">
-            <a:off x="3083831" y="4201688"/>
+            <a:off x="6771175" y="4954437"/>
             <a:ext cx="1248697" cy="646331"/>
           </a:xfrm>
           <a:prstGeom prst="rect">
@@ -8205,7 +9151,7 @@
         </p:nvSpPr>
         <p:spPr>
           <a:xfrm>
-            <a:off x="2689014" y="3014185"/>
+            <a:off x="6376358" y="3766934"/>
             <a:ext cx="1602800" cy="369332"/>
           </a:xfrm>
           <a:prstGeom prst="rect">
@@ -8263,7 +9209,7 @@
         </p:nvSpPr>
         <p:spPr>
           <a:xfrm>
-            <a:off x="3456990" y="610112"/>
+            <a:off x="7147947" y="646836"/>
             <a:ext cx="1602800" cy="369332"/>
           </a:xfrm>
           <a:prstGeom prst="rect">
@@ -8321,7 +9267,7 @@
         </p:nvSpPr>
         <p:spPr>
           <a:xfrm>
-            <a:off x="3410131" y="209996"/>
+            <a:off x="7101088" y="246720"/>
             <a:ext cx="806245" cy="369332"/>
           </a:xfrm>
           <a:prstGeom prst="rect">
@@ -8356,7 +9302,7 @@
         </p:nvSpPr>
         <p:spPr>
           <a:xfrm>
-            <a:off x="2816592" y="2556282"/>
+            <a:off x="6503936" y="3309031"/>
             <a:ext cx="806245" cy="369332"/>
           </a:xfrm>
           <a:prstGeom prst="rect">
@@ -8393,7 +9339,7 @@
         </p:nvSpPr>
         <p:spPr>
           <a:xfrm>
-            <a:off x="2729293" y="-178299"/>
+            <a:off x="6420250" y="-141575"/>
             <a:ext cx="1243476" cy="1404000"/>
           </a:xfrm>
           <a:prstGeom prst="arc">
@@ -8450,7 +9396,7 @@
         </p:nvSpPr>
         <p:spPr>
           <a:xfrm>
-            <a:off x="1362017" y="2230902"/>
+            <a:off x="5049013" y="2976363"/>
             <a:ext cx="1243476" cy="1404000"/>
           </a:xfrm>
           <a:prstGeom prst="arc">

</xml_diff>